<commit_message>
Uppdatering av NextBirthday CRUD
</commit_message>
<xml_diff>
--- a/Presentationsmaterial/Dokument/1.6 CRUD, Layout Pages och Partial Views.pptx
+++ b/Presentationsmaterial/Dokument/1.6 CRUD, Layout Pages och Partial Views.pptx
@@ -250,7 +250,7 @@
             <a:fld id="{0B3BAAB0-D539-4A20-AE97-450346457396}" type="datetimeFigureOut">
               <a:rPr lang="sv-SE" smtClean="0"/>
               <a:pPr/>
-              <a:t>2014-11-14</a:t>
+              <a:t>2014-11-16</a:t>
             </a:fld>
             <a:endParaRPr lang="sv-SE" dirty="0"/>
           </a:p>
@@ -3814,88 +3814,24 @@
           <a:chExt cx="0" cy="0"/>
         </a:xfrm>
       </p:grpSpPr>
-      <p:sp>
-        <p:nvSpPr>
-          <p:cNvPr id="3" name="Platshållare för innehåll 2"/>
-          <p:cNvSpPr>
-            <a:spLocks noGrp="1"/>
-          </p:cNvSpPr>
-          <p:nvPr>
-            <p:ph idx="1"/>
-          </p:nvPr>
-        </p:nvSpPr>
-        <p:spPr>
-          <a:xfrm>
-            <a:off x="429064" y="824597"/>
-            <a:ext cx="8229600" cy="4619625"/>
-          </a:xfrm>
-        </p:spPr>
-        <p:txBody>
-          <a:bodyPr/>
-          <a:lstStyle/>
-          <a:p>
-            <a:r>
-              <a:rPr lang="sv-SE" dirty="0" smtClean="0"/>
-              <a:t>Det redigerade födelsedatat postas till en </a:t>
-            </a:r>
-            <a:r>
-              <a:rPr lang="sv-SE" i="1" dirty="0" smtClean="0"/>
-              <a:t>action method</a:t>
-            </a:r>
-            <a:r>
-              <a:rPr lang="sv-SE" dirty="0" smtClean="0"/>
-              <a:t> med namnet </a:t>
-            </a:r>
-            <a:r>
-              <a:rPr lang="sv-SE" sz="1600" dirty="0" smtClean="0">
-                <a:latin typeface="Courier New" pitchFamily="49" charset="0"/>
-                <a:cs typeface="Courier New" pitchFamily="49" charset="0"/>
-              </a:rPr>
-              <a:t>Edit</a:t>
-            </a:r>
-            <a:r>
-              <a:rPr lang="sv-SE" dirty="0" smtClean="0"/>
-              <a:t>, som skapar ett </a:t>
-            </a:r>
-            <a:r>
-              <a:rPr lang="sv-SE" sz="1600" dirty="0" smtClean="0">
-                <a:latin typeface="Courier New" pitchFamily="49" charset="0"/>
-                <a:cs typeface="Courier New" pitchFamily="49" charset="0"/>
-              </a:rPr>
-              <a:t>Birthdate</a:t>
-            </a:r>
-            <a:r>
-              <a:rPr lang="sv-SE" dirty="0" smtClean="0"/>
-              <a:t>-objekt, utifrån datat i formuläret, uppdaterar objektet, sparar det i databasen och visar ett rättmeddelande. Inträffar fel visas formuläret innehållande felmeddelande(n).</a:t>
-            </a:r>
-          </a:p>
-        </p:txBody>
-      </p:sp>
       <p:pic>
         <p:nvPicPr>
-          <p:cNvPr id="8195" name="Picture 3"/>
+          <p:cNvPr id="4" name="Bildobjekt 3"/>
           <p:cNvPicPr>
-            <a:picLocks noChangeAspect="1" noChangeArrowheads="1"/>
+            <a:picLocks noChangeAspect="1"/>
           </p:cNvPicPr>
           <p:nvPr/>
         </p:nvPicPr>
         <p:blipFill>
-          <a:blip r:embed="rId2">
-            <a:extLst>
-              <a:ext uri="{28A0092B-C50C-407E-A947-70E740481C1C}">
-                <a14:useLocalDpi xmlns:a14="http://schemas.microsoft.com/office/drawing/2010/main" val="0"/>
-              </a:ext>
-            </a:extLst>
-          </a:blip>
-          <a:srcRect/>
+          <a:blip r:embed="rId2"/>
           <a:stretch>
             <a:fillRect/>
           </a:stretch>
         </p:blipFill>
-        <p:spPr bwMode="auto">
-          <a:xfrm rot="420000">
-            <a:off x="4595825" y="2900830"/>
-            <a:ext cx="3573333" cy="1860000"/>
+        <p:spPr>
+          <a:xfrm rot="224671">
+            <a:off x="1023704" y="2119220"/>
+            <a:ext cx="6828112" cy="3355377"/>
           </a:xfrm>
           <a:prstGeom prst="rect">
             <a:avLst/>
@@ -3932,73 +3868,65 @@
               <a:srgbClr val="969696"/>
             </a:contourClr>
           </a:sp3d>
-          <a:extLst/>
         </p:spPr>
       </p:pic>
-      <p:pic>
-        <p:nvPicPr>
-          <p:cNvPr id="8197" name="Picture 5"/>
-          <p:cNvPicPr>
-            <a:picLocks noChangeAspect="1" noChangeArrowheads="1"/>
-          </p:cNvPicPr>
-          <p:nvPr/>
-        </p:nvPicPr>
-        <p:blipFill>
-          <a:blip r:embed="rId3">
-            <a:extLst>
-              <a:ext uri="{28A0092B-C50C-407E-A947-70E740481C1C}">
-                <a14:useLocalDpi xmlns:a14="http://schemas.microsoft.com/office/drawing/2010/main" val="0"/>
-              </a:ext>
-            </a:extLst>
-          </a:blip>
-          <a:srcRect/>
-          <a:stretch>
-            <a:fillRect/>
-          </a:stretch>
-        </p:blipFill>
-        <p:spPr bwMode="auto">
+      <p:sp>
+        <p:nvSpPr>
+          <p:cNvPr id="3" name="Platshållare för innehåll 2"/>
+          <p:cNvSpPr>
+            <a:spLocks noGrp="1"/>
+          </p:cNvSpPr>
+          <p:nvPr>
+            <p:ph idx="1"/>
+          </p:nvPr>
+        </p:nvSpPr>
+        <p:spPr>
           <a:xfrm>
-            <a:off x="956251" y="2537497"/>
-            <a:ext cx="3473334" cy="2586667"/>
+            <a:off x="429064" y="824597"/>
+            <a:ext cx="8229600" cy="4619625"/>
           </a:xfrm>
-          <a:prstGeom prst="rect">
-            <a:avLst/>
-          </a:prstGeom>
-          <a:solidFill>
-            <a:srgbClr val="FFFFFF">
-              <a:shade val="85000"/>
-            </a:srgbClr>
-          </a:solidFill>
-          <a:ln w="190500" cap="sq">
-            <a:solidFill>
-              <a:srgbClr val="FFFFFF"/>
-            </a:solidFill>
-            <a:miter lim="800000"/>
-          </a:ln>
-          <a:effectLst>
-            <a:outerShdw blurRad="65000" dist="50800" dir="12900000" kx="195000" ky="145000" algn="tl" rotWithShape="0">
-              <a:srgbClr val="000000">
-                <a:alpha val="30000"/>
-              </a:srgbClr>
-            </a:outerShdw>
-          </a:effectLst>
-          <a:scene3d>
-            <a:camera prst="orthographicFront">
-              <a:rot lat="0" lon="0" rev="360000"/>
-            </a:camera>
-            <a:lightRig rig="twoPt" dir="t">
-              <a:rot lat="0" lon="0" rev="7200000"/>
-            </a:lightRig>
-          </a:scene3d>
-          <a:sp3d contourW="12700">
-            <a:bevelT w="25400" h="19050"/>
-            <a:contourClr>
-              <a:srgbClr val="969696"/>
-            </a:contourClr>
-          </a:sp3d>
-          <a:extLst/>
         </p:spPr>
-      </p:pic>
+        <p:txBody>
+          <a:bodyPr/>
+          <a:lstStyle/>
+          <a:p>
+            <a:r>
+              <a:rPr lang="sv-SE" dirty="0" smtClean="0"/>
+              <a:t>Det redigerade födelsedatat postas till en </a:t>
+            </a:r>
+            <a:r>
+              <a:rPr lang="sv-SE" i="1" dirty="0" smtClean="0"/>
+              <a:t>action method</a:t>
+            </a:r>
+            <a:r>
+              <a:rPr lang="sv-SE" dirty="0" smtClean="0"/>
+              <a:t> med namnet </a:t>
+            </a:r>
+            <a:r>
+              <a:rPr lang="sv-SE" sz="1600" dirty="0" smtClean="0">
+                <a:latin typeface="Courier New" pitchFamily="49" charset="0"/>
+                <a:cs typeface="Courier New" pitchFamily="49" charset="0"/>
+              </a:rPr>
+              <a:t>Edit</a:t>
+            </a:r>
+            <a:r>
+              <a:rPr lang="sv-SE" dirty="0" smtClean="0"/>
+              <a:t>, som skapar ett </a:t>
+            </a:r>
+            <a:r>
+              <a:rPr lang="sv-SE" sz="1600" dirty="0" smtClean="0">
+                <a:latin typeface="Courier New" pitchFamily="49" charset="0"/>
+                <a:cs typeface="Courier New" pitchFamily="49" charset="0"/>
+              </a:rPr>
+              <a:t>Birthdate</a:t>
+            </a:r>
+            <a:r>
+              <a:rPr lang="sv-SE" dirty="0" smtClean="0"/>
+              <a:t>-objekt, utifrån datat i formuläret, uppdaterar objektet, sparar det i databasen och visar ett rättmeddelande. Inträffar fel visas formuläret innehållande felmeddelande(n).</a:t>
+            </a:r>
+          </a:p>
+        </p:txBody>
+      </p:sp>
       <p:sp>
         <p:nvSpPr>
           <p:cNvPr id="2" name="Rubrik 1"/>
@@ -4059,29 +3987,22 @@
       </p:grpSpPr>
       <p:pic>
         <p:nvPicPr>
-          <p:cNvPr id="9219" name="Picture 3"/>
+          <p:cNvPr id="4" name="Bildobjekt 3"/>
           <p:cNvPicPr>
-            <a:picLocks noChangeAspect="1" noChangeArrowheads="1"/>
+            <a:picLocks noChangeAspect="1"/>
           </p:cNvPicPr>
           <p:nvPr/>
         </p:nvPicPr>
         <p:blipFill>
-          <a:blip r:embed="rId2">
-            <a:extLst>
-              <a:ext uri="{28A0092B-C50C-407E-A947-70E740481C1C}">
-                <a14:useLocalDpi xmlns:a14="http://schemas.microsoft.com/office/drawing/2010/main" val="0"/>
-              </a:ext>
-            </a:extLst>
-          </a:blip>
-          <a:srcRect/>
+          <a:blip r:embed="rId2"/>
           <a:stretch>
             <a:fillRect/>
           </a:stretch>
         </p:blipFill>
-        <p:spPr bwMode="auto">
+        <p:spPr>
           <a:xfrm>
-            <a:off x="390191" y="3075826"/>
-            <a:ext cx="4614286" cy="2400000"/>
+            <a:off x="390191" y="3061425"/>
+            <a:ext cx="4812447" cy="2164268"/>
           </a:xfrm>
           <a:prstGeom prst="rect">
             <a:avLst/>
@@ -4092,9 +4013,7 @@
             </a:srgbClr>
           </a:solidFill>
           <a:ln w="190500" cap="sq">
-            <a:solidFill>
-              <a:srgbClr val="FFFFFF"/>
-            </a:solidFill>
+            <a:noFill/>
             <a:miter lim="800000"/>
           </a:ln>
           <a:effectLst>
@@ -4118,34 +4037,26 @@
               <a:srgbClr val="969696"/>
             </a:contourClr>
           </a:sp3d>
-          <a:extLst/>
         </p:spPr>
       </p:pic>
       <p:pic>
         <p:nvPicPr>
-          <p:cNvPr id="9221" name="Picture 5"/>
+          <p:cNvPr id="7" name="Bildobjekt 6"/>
           <p:cNvPicPr>
-            <a:picLocks noChangeAspect="1" noChangeArrowheads="1"/>
+            <a:picLocks noChangeAspect="1"/>
           </p:cNvPicPr>
           <p:nvPr/>
         </p:nvPicPr>
         <p:blipFill>
-          <a:blip r:embed="rId3">
-            <a:extLst>
-              <a:ext uri="{28A0092B-C50C-407E-A947-70E740481C1C}">
-                <a14:useLocalDpi xmlns:a14="http://schemas.microsoft.com/office/drawing/2010/main" val="0"/>
-              </a:ext>
-            </a:extLst>
-          </a:blip>
-          <a:srcRect/>
+          <a:blip r:embed="rId3"/>
           <a:stretch>
             <a:fillRect/>
           </a:stretch>
         </p:blipFill>
-        <p:spPr bwMode="auto">
+        <p:spPr>
           <a:xfrm rot="540000">
-            <a:off x="3621470" y="2859370"/>
-            <a:ext cx="2414286" cy="2457143"/>
+            <a:off x="3586332" y="2884943"/>
+            <a:ext cx="4911516" cy="2960627"/>
           </a:xfrm>
           <a:prstGeom prst="rect">
             <a:avLst/>
@@ -4156,9 +4067,7 @@
             </a:srgbClr>
           </a:solidFill>
           <a:ln w="190500" cap="sq">
-            <a:solidFill>
-              <a:srgbClr val="FFFFFF"/>
-            </a:solidFill>
+            <a:noFill/>
             <a:miter lim="800000"/>
           </a:ln>
           <a:effectLst>
@@ -4182,69 +4091,26 @@
               <a:srgbClr val="969696"/>
             </a:contourClr>
           </a:sp3d>
-          <a:extLst/>
         </p:spPr>
       </p:pic>
-      <p:sp>
-        <p:nvSpPr>
-          <p:cNvPr id="3" name="Platshållare för innehåll 2"/>
-          <p:cNvSpPr>
-            <a:spLocks noGrp="1"/>
-          </p:cNvSpPr>
-          <p:nvPr>
-            <p:ph idx="1"/>
-          </p:nvPr>
-        </p:nvSpPr>
-        <p:spPr/>
-        <p:txBody>
-          <a:bodyPr/>
-          <a:lstStyle/>
-          <a:p>
-            <a:r>
-              <a:rPr lang="sv-SE" dirty="0" smtClean="0"/>
-              <a:t>Bortagning av födelsedag följer i stora drag samma principer som redigering av födelsedata. MEN…</a:t>
-            </a:r>
-          </a:p>
-          <a:p>
-            <a:r>
-              <a:rPr lang="sv-SE" dirty="0" smtClean="0"/>
-              <a:t>…det är viktigt att födelsedata inte kan tas bort från databasen med en GET-förfrågan. Det måste åtminstone göras med en POST-förfrågan varför någon form av bekräftelseformulär är lämpligt att använda.</a:t>
-            </a:r>
-          </a:p>
-          <a:p>
-            <a:r>
-              <a:rPr lang="sv-SE" dirty="0" smtClean="0"/>
-              <a:t>Det är även lämpligt att användaren får ett rättmeddelande då födelsedatat tagits bort.</a:t>
-            </a:r>
-            <a:endParaRPr lang="sv-SE" dirty="0"/>
-          </a:p>
-        </p:txBody>
-      </p:sp>
       <p:pic>
         <p:nvPicPr>
-          <p:cNvPr id="9220" name="Picture 4"/>
+          <p:cNvPr id="6" name="Bildobjekt 5"/>
           <p:cNvPicPr>
-            <a:picLocks noChangeAspect="1" noChangeArrowheads="1"/>
+            <a:picLocks noChangeAspect="1"/>
           </p:cNvPicPr>
           <p:nvPr/>
         </p:nvPicPr>
         <p:blipFill>
-          <a:blip r:embed="rId4">
-            <a:extLst>
-              <a:ext uri="{28A0092B-C50C-407E-A947-70E740481C1C}">
-                <a14:useLocalDpi xmlns:a14="http://schemas.microsoft.com/office/drawing/2010/main" val="0"/>
-              </a:ext>
-            </a:extLst>
-          </a:blip>
-          <a:srcRect/>
+          <a:blip r:embed="rId4"/>
           <a:stretch>
             <a:fillRect/>
           </a:stretch>
         </p:blipFill>
-        <p:spPr bwMode="auto">
-          <a:xfrm rot="540000">
-            <a:off x="3621470" y="2859370"/>
-            <a:ext cx="2414286" cy="2457143"/>
+        <p:spPr>
+          <a:xfrm rot="600000">
+            <a:off x="6037804" y="2908071"/>
+            <a:ext cx="4298053" cy="1920407"/>
           </a:xfrm>
           <a:prstGeom prst="rect">
             <a:avLst/>
@@ -4255,9 +4121,7 @@
             </a:srgbClr>
           </a:solidFill>
           <a:ln w="190500" cap="sq">
-            <a:solidFill>
-              <a:srgbClr val="FFFFFF"/>
-            </a:solidFill>
+            <a:noFill/>
             <a:miter lim="800000"/>
           </a:ln>
           <a:effectLst>
@@ -4281,137 +4145,75 @@
               <a:srgbClr val="969696"/>
             </a:contourClr>
           </a:sp3d>
-          <a:extLst/>
         </p:spPr>
       </p:pic>
-      <p:pic>
-        <p:nvPicPr>
-          <p:cNvPr id="9224" name="Picture 8"/>
-          <p:cNvPicPr>
-            <a:picLocks noChangeAspect="1" noChangeArrowheads="1"/>
-          </p:cNvPicPr>
-          <p:nvPr/>
-        </p:nvPicPr>
-        <p:blipFill>
-          <a:blip r:embed="rId5">
-            <a:extLst>
-              <a:ext uri="{28A0092B-C50C-407E-A947-70E740481C1C}">
-                <a14:useLocalDpi xmlns:a14="http://schemas.microsoft.com/office/drawing/2010/main" val="0"/>
-              </a:ext>
-            </a:extLst>
-          </a:blip>
-          <a:srcRect/>
-          <a:stretch>
-            <a:fillRect/>
-          </a:stretch>
-        </p:blipFill>
-        <p:spPr bwMode="auto">
-          <a:xfrm rot="600000">
-            <a:off x="5873832" y="2908850"/>
-            <a:ext cx="4095239" cy="1857143"/>
-          </a:xfrm>
-          <a:prstGeom prst="rect">
-            <a:avLst/>
-          </a:prstGeom>
-          <a:solidFill>
-            <a:srgbClr val="FFFFFF">
-              <a:shade val="85000"/>
-            </a:srgbClr>
-          </a:solidFill>
-          <a:ln w="190500" cap="sq">
-            <a:solidFill>
-              <a:srgbClr val="FFFFFF"/>
-            </a:solidFill>
-            <a:miter lim="800000"/>
-          </a:ln>
-          <a:effectLst>
-            <a:outerShdw blurRad="65000" dist="50800" dir="12900000" kx="195000" ky="145000" algn="tl" rotWithShape="0">
-              <a:srgbClr val="000000">
-                <a:alpha val="30000"/>
-              </a:srgbClr>
-            </a:outerShdw>
-          </a:effectLst>
-          <a:scene3d>
-            <a:camera prst="orthographicFront">
-              <a:rot lat="0" lon="0" rev="360000"/>
-            </a:camera>
-            <a:lightRig rig="twoPt" dir="t">
-              <a:rot lat="0" lon="0" rev="7200000"/>
-            </a:lightRig>
-          </a:scene3d>
-          <a:sp3d contourW="12700">
-            <a:bevelT w="25400" h="19050"/>
-            <a:contourClr>
-              <a:srgbClr val="969696"/>
-            </a:contourClr>
-          </a:sp3d>
-          <a:extLst/>
-        </p:spPr>
-      </p:pic>
-      <p:pic>
-        <p:nvPicPr>
-          <p:cNvPr id="9223" name="Picture 7"/>
-          <p:cNvPicPr>
-            <a:picLocks noChangeAspect="1" noChangeArrowheads="1"/>
-          </p:cNvPicPr>
-          <p:nvPr/>
-        </p:nvPicPr>
-        <p:blipFill>
-          <a:blip r:embed="rId6">
-            <a:extLst>
-              <a:ext uri="{28A0092B-C50C-407E-A947-70E740481C1C}">
-                <a14:useLocalDpi xmlns:a14="http://schemas.microsoft.com/office/drawing/2010/main" val="0"/>
-              </a:ext>
-            </a:extLst>
-          </a:blip>
-          <a:srcRect/>
-          <a:stretch>
-            <a:fillRect/>
-          </a:stretch>
-        </p:blipFill>
-        <p:spPr bwMode="auto">
-          <a:xfrm rot="180000">
-            <a:off x="6066287" y="4474156"/>
-            <a:ext cx="2495239" cy="1100000"/>
-          </a:xfrm>
-          <a:prstGeom prst="rect">
-            <a:avLst/>
-          </a:prstGeom>
-          <a:solidFill>
-            <a:srgbClr val="FFFFFF">
-              <a:shade val="85000"/>
-            </a:srgbClr>
-          </a:solidFill>
-          <a:ln w="190500" cap="sq">
-            <a:solidFill>
-              <a:srgbClr val="FFFFFF"/>
-            </a:solidFill>
-            <a:miter lim="800000"/>
-          </a:ln>
-          <a:effectLst>
-            <a:outerShdw blurRad="65000" dist="50800" dir="12900000" kx="195000" ky="145000" algn="tl" rotWithShape="0">
-              <a:srgbClr val="000000">
-                <a:alpha val="30000"/>
-              </a:srgbClr>
-            </a:outerShdw>
-          </a:effectLst>
-          <a:scene3d>
-            <a:camera prst="orthographicFront">
-              <a:rot lat="0" lon="0" rev="360000"/>
-            </a:camera>
-            <a:lightRig rig="twoPt" dir="t">
-              <a:rot lat="0" lon="0" rev="7200000"/>
-            </a:lightRig>
-          </a:scene3d>
-          <a:sp3d contourW="12700">
-            <a:bevelT w="25400" h="19050"/>
-            <a:contourClr>
-              <a:srgbClr val="969696"/>
-            </a:contourClr>
-          </a:sp3d>
-          <a:extLst/>
-        </p:spPr>
-      </p:pic>
+      <p:sp>
+        <p:nvSpPr>
+          <p:cNvPr id="3" name="Platshållare för innehåll 2"/>
+          <p:cNvSpPr>
+            <a:spLocks noGrp="1"/>
+          </p:cNvSpPr>
+          <p:nvPr>
+            <p:ph idx="1"/>
+          </p:nvPr>
+        </p:nvSpPr>
+        <p:spPr/>
+        <p:txBody>
+          <a:bodyPr/>
+          <a:lstStyle/>
+          <a:p>
+            <a:r>
+              <a:rPr lang="sv-SE" dirty="0" smtClean="0"/>
+              <a:t>Bortagning av födelsedag följer i stora drag samma principer som redigering av födelsedata. MEN…</a:t>
+            </a:r>
+          </a:p>
+          <a:p>
+            <a:r>
+              <a:rPr lang="sv-SE" dirty="0" smtClean="0"/>
+              <a:t>…det är viktigt att födelsedata inte kan tas bort från databasen med en GET-förfrågan. Det måste åtminstone göras med en POST-förfrågan varför någon form av bekräftelseformulär är lämpligt att använda.</a:t>
+            </a:r>
+          </a:p>
+          <a:p>
+            <a:r>
+              <a:rPr lang="sv-SE" dirty="0" smtClean="0">
+                <a:solidFill>
+                  <a:schemeClr val="bg1">
+                    <a:lumMod val="65000"/>
+                  </a:schemeClr>
+                </a:solidFill>
+              </a:rPr>
+              <a:t>(Det </a:t>
+            </a:r>
+            <a:r>
+              <a:rPr lang="sv-SE" dirty="0" smtClean="0">
+                <a:solidFill>
+                  <a:schemeClr val="bg1">
+                    <a:lumMod val="65000"/>
+                  </a:schemeClr>
+                </a:solidFill>
+              </a:rPr>
+              <a:t>är även lämpligt att användaren får ett rättmeddelande då födelsedatat tagits bort</a:t>
+            </a:r>
+            <a:r>
+              <a:rPr lang="sv-SE" dirty="0" smtClean="0">
+                <a:solidFill>
+                  <a:schemeClr val="bg1">
+                    <a:lumMod val="65000"/>
+                  </a:schemeClr>
+                </a:solidFill>
+              </a:rPr>
+              <a:t>.)</a:t>
+            </a:r>
+            <a:endParaRPr lang="sv-SE" dirty="0">
+              <a:solidFill>
+                <a:schemeClr val="bg1">
+                  <a:lumMod val="65000"/>
+                </a:schemeClr>
+              </a:solidFill>
+            </a:endParaRPr>
+          </a:p>
+        </p:txBody>
+      </p:sp>
       <p:sp>
         <p:nvSpPr>
           <p:cNvPr id="2" name="Rubrik 1"/>
@@ -4478,7 +4280,7 @@
         </p:nvSpPr>
         <p:spPr bwMode="auto">
           <a:xfrm>
-            <a:off x="5434337" y="3109215"/>
+            <a:off x="6318754" y="2067405"/>
             <a:ext cx="118412" cy="118412"/>
           </a:xfrm>
           <a:prstGeom prst="ellipse">
@@ -4537,80 +4339,22 @@
       </p:sp>
       <p:pic>
         <p:nvPicPr>
-          <p:cNvPr id="10247" name="Picture 7" descr="C:\Users\mats\AppData\Local\Temp\SNAGHTMLf74197a.PNG"/>
+          <p:cNvPr id="7" name="Bildobjekt 6"/>
           <p:cNvPicPr>
-            <a:picLocks noChangeAspect="1" noChangeArrowheads="1"/>
+            <a:picLocks noChangeAspect="1"/>
           </p:cNvPicPr>
           <p:nvPr/>
         </p:nvPicPr>
         <p:blipFill>
-          <a:blip r:embed="rId2">
-            <a:extLst>
-              <a:ext uri="{28A0092B-C50C-407E-A947-70E740481C1C}">
-                <a14:useLocalDpi xmlns:a14="http://schemas.microsoft.com/office/drawing/2010/main" val="0"/>
-              </a:ext>
-            </a:extLst>
-          </a:blip>
-          <a:srcRect/>
+          <a:blip r:embed="rId2"/>
           <a:stretch>
             <a:fillRect/>
           </a:stretch>
         </p:blipFill>
-        <p:spPr bwMode="auto">
-          <a:xfrm rot="784561">
-            <a:off x="7282592" y="1027622"/>
-            <a:ext cx="2171429" cy="2419048"/>
-          </a:xfrm>
-          <a:prstGeom prst="rect">
-            <a:avLst/>
-          </a:prstGeom>
-          <a:noFill/>
-          <a:ln w="9525">
-            <a:noFill/>
-            <a:miter lim="800000"/>
-            <a:headEnd/>
-            <a:tailEnd/>
-          </a:ln>
-          <a:scene3d>
-            <a:camera prst="perspectiveContrastingLeftFacing"/>
-            <a:lightRig rig="threePt" dir="t"/>
-          </a:scene3d>
-          <a:extLst>
-            <a:ext uri="{909E8E84-426E-40DD-AFC4-6F175D3DCCD1}">
-              <a14:hiddenFill xmlns:a14="http://schemas.microsoft.com/office/drawing/2010/main">
-                <a:solidFill>
-                  <a:srgbClr val="FFFFFF"/>
-                </a:solidFill>
-              </a14:hiddenFill>
-            </a:ext>
-          </a:extLst>
-        </p:spPr>
-      </p:pic>
-      <p:pic>
-        <p:nvPicPr>
-          <p:cNvPr id="10245" name="Picture 5"/>
-          <p:cNvPicPr>
-            <a:picLocks noChangeAspect="1" noChangeArrowheads="1"/>
-          </p:cNvPicPr>
-          <p:nvPr/>
-        </p:nvPicPr>
-        <p:blipFill>
-          <a:blip r:embed="rId3">
-            <a:extLst>
-              <a:ext uri="{28A0092B-C50C-407E-A947-70E740481C1C}">
-                <a14:useLocalDpi xmlns:a14="http://schemas.microsoft.com/office/drawing/2010/main" val="0"/>
-              </a:ext>
-            </a:extLst>
-          </a:blip>
-          <a:srcRect/>
-          <a:stretch>
-            <a:fillRect/>
-          </a:stretch>
-        </p:blipFill>
-        <p:spPr bwMode="auto">
-          <a:xfrm>
-            <a:off x="5102494" y="1616957"/>
-            <a:ext cx="5572125" cy="3695700"/>
+        <p:spPr>
+          <a:xfrm rot="360000">
+            <a:off x="4525964" y="1252815"/>
+            <a:ext cx="4427604" cy="4816257"/>
           </a:xfrm>
           <a:prstGeom prst="rect">
             <a:avLst/>
@@ -4647,65 +4391,61 @@
               <a:srgbClr val="FFFFFF"/>
             </a:contourClr>
           </a:sp3d>
-          <a:extLst/>
         </p:spPr>
       </p:pic>
-      <p:sp>
-        <p:nvSpPr>
-          <p:cNvPr id="3" name="Platshållare för innehåll 2"/>
-          <p:cNvSpPr>
-            <a:spLocks noGrp="1"/>
-          </p:cNvSpPr>
-          <p:nvPr>
-            <p:ph idx="1"/>
-          </p:nvPr>
-        </p:nvSpPr>
-        <p:spPr/>
-        <p:txBody>
-          <a:bodyPr/>
-          <a:lstStyle/>
-          <a:p>
-            <a:r>
-              <a:rPr lang="sv-SE" dirty="0" smtClean="0"/>
-              <a:t>Då vyer, som Create och Edit, till stora delar har samma innehåll kan det gemensamma innehållet brytas ut och placeras i en partiell vy, </a:t>
-            </a:r>
-            <a:r>
-              <a:rPr lang="sv-SE" i="1" dirty="0" smtClean="0"/>
-              <a:t>partial view</a:t>
-            </a:r>
-            <a:r>
-              <a:rPr lang="sv-SE" dirty="0" smtClean="0"/>
-              <a:t>.</a:t>
-            </a:r>
-            <a:endParaRPr lang="sv-SE" dirty="0"/>
-          </a:p>
-        </p:txBody>
-      </p:sp>
       <p:pic>
         <p:nvPicPr>
-          <p:cNvPr id="10243" name="Picture 3"/>
+          <p:cNvPr id="10" name="Bildobjekt 9"/>
           <p:cNvPicPr>
-            <a:picLocks noChangeAspect="1" noChangeArrowheads="1"/>
+            <a:picLocks noChangeAspect="1"/>
           </p:cNvPicPr>
           <p:nvPr/>
         </p:nvPicPr>
         <p:blipFill>
-          <a:blip r:embed="rId4">
-            <a:extLst>
-              <a:ext uri="{28A0092B-C50C-407E-A947-70E740481C1C}">
-                <a14:useLocalDpi xmlns:a14="http://schemas.microsoft.com/office/drawing/2010/main" val="0"/>
-              </a:ext>
-            </a:extLst>
-          </a:blip>
-          <a:srcRect/>
+          <a:blip r:embed="rId3"/>
           <a:stretch>
             <a:fillRect/>
           </a:stretch>
         </p:blipFill>
-        <p:spPr bwMode="auto">
+        <p:spPr>
+          <a:xfrm rot="480000">
+            <a:off x="7395411" y="985817"/>
+            <a:ext cx="2103302" cy="1463167"/>
+          </a:xfrm>
+          <a:prstGeom prst="rect">
+            <a:avLst/>
+          </a:prstGeom>
+          <a:noFill/>
+          <a:ln w="9525">
+            <a:noFill/>
+            <a:miter lim="800000"/>
+            <a:headEnd/>
+            <a:tailEnd/>
+          </a:ln>
+          <a:scene3d>
+            <a:camera prst="perspectiveContrastingLeftFacing"/>
+            <a:lightRig rig="threePt" dir="t"/>
+          </a:scene3d>
+        </p:spPr>
+      </p:pic>
+      <p:pic>
+        <p:nvPicPr>
+          <p:cNvPr id="6" name="Bildobjekt 5"/>
+          <p:cNvPicPr>
+            <a:picLocks noChangeAspect="1"/>
+          </p:cNvPicPr>
+          <p:nvPr/>
+        </p:nvPicPr>
+        <p:blipFill>
+          <a:blip r:embed="rId4"/>
+          <a:stretch>
+            <a:fillRect/>
+          </a:stretch>
+        </p:blipFill>
+        <p:spPr>
           <a:xfrm>
-            <a:off x="358433" y="1361590"/>
-            <a:ext cx="5000625" cy="2962275"/>
+            <a:off x="455164" y="1443886"/>
+            <a:ext cx="3269263" cy="2400508"/>
           </a:xfrm>
           <a:prstGeom prst="rect">
             <a:avLst/>
@@ -4742,34 +4482,26 @@
               <a:srgbClr val="FFFFFF"/>
             </a:contourClr>
           </a:sp3d>
-          <a:extLst/>
         </p:spPr>
       </p:pic>
       <p:pic>
         <p:nvPicPr>
-          <p:cNvPr id="10242" name="Picture 2"/>
+          <p:cNvPr id="5" name="Bildobjekt 4"/>
           <p:cNvPicPr>
-            <a:picLocks noChangeAspect="1" noChangeArrowheads="1"/>
+            <a:picLocks noChangeAspect="1"/>
           </p:cNvPicPr>
           <p:nvPr/>
         </p:nvPicPr>
         <p:blipFill>
-          <a:blip r:embed="rId5">
-            <a:extLst>
-              <a:ext uri="{28A0092B-C50C-407E-A947-70E740481C1C}">
-                <a14:useLocalDpi xmlns:a14="http://schemas.microsoft.com/office/drawing/2010/main" val="0"/>
-              </a:ext>
-            </a:extLst>
-          </a:blip>
-          <a:srcRect/>
+          <a:blip r:embed="rId5"/>
           <a:stretch>
             <a:fillRect/>
           </a:stretch>
         </p:blipFill>
-        <p:spPr bwMode="auto">
+        <p:spPr>
           <a:xfrm rot="21060000">
-            <a:off x="1059041" y="2502673"/>
-            <a:ext cx="5000625" cy="2971800"/>
+            <a:off x="876255" y="2669821"/>
+            <a:ext cx="3200677" cy="2400508"/>
           </a:xfrm>
           <a:prstGeom prst="rect">
             <a:avLst/>
@@ -4806,9 +4538,39 @@
               <a:srgbClr val="FFFFFF"/>
             </a:contourClr>
           </a:sp3d>
-          <a:extLst/>
         </p:spPr>
       </p:pic>
+      <p:sp>
+        <p:nvSpPr>
+          <p:cNvPr id="3" name="Platshållare för innehåll 2"/>
+          <p:cNvSpPr>
+            <a:spLocks noGrp="1"/>
+          </p:cNvSpPr>
+          <p:nvPr>
+            <p:ph idx="1"/>
+          </p:nvPr>
+        </p:nvSpPr>
+        <p:spPr/>
+        <p:txBody>
+          <a:bodyPr/>
+          <a:lstStyle/>
+          <a:p>
+            <a:r>
+              <a:rPr lang="sv-SE" dirty="0" smtClean="0"/>
+              <a:t>Då vyer, som Create och Edit, till stora delar har samma innehåll kan det gemensamma innehållet brytas ut och placeras i en partiell vy, </a:t>
+            </a:r>
+            <a:r>
+              <a:rPr lang="sv-SE" i="1" dirty="0" smtClean="0"/>
+              <a:t>partial view</a:t>
+            </a:r>
+            <a:r>
+              <a:rPr lang="sv-SE" dirty="0" smtClean="0"/>
+              <a:t>.</a:t>
+            </a:r>
+            <a:endParaRPr lang="sv-SE" dirty="0"/>
+          </a:p>
+        </p:txBody>
+      </p:sp>
       <p:sp>
         <p:nvSpPr>
           <p:cNvPr id="2" name="Rubrik 1"/>
@@ -4832,171 +4594,18 @@
           </a:p>
         </p:txBody>
       </p:sp>
-      <p:pic>
-        <p:nvPicPr>
-          <p:cNvPr id="10244" name="Picture 4"/>
-          <p:cNvPicPr>
-            <a:picLocks noChangeAspect="1" noChangeArrowheads="1"/>
-          </p:cNvPicPr>
-          <p:nvPr/>
-        </p:nvPicPr>
-        <p:blipFill>
-          <a:blip r:embed="rId6">
-            <a:extLst>
-              <a:ext uri="{28A0092B-C50C-407E-A947-70E740481C1C}">
-                <a14:useLocalDpi xmlns:a14="http://schemas.microsoft.com/office/drawing/2010/main" val="0"/>
-              </a:ext>
-            </a:extLst>
-          </a:blip>
-          <a:srcRect/>
-          <a:stretch>
-            <a:fillRect/>
-          </a:stretch>
-        </p:blipFill>
-        <p:spPr bwMode="auto">
-          <a:xfrm rot="360000">
-            <a:off x="3784030" y="2358807"/>
-            <a:ext cx="6665913" cy="4648200"/>
-          </a:xfrm>
-          <a:prstGeom prst="rect">
-            <a:avLst/>
-          </a:prstGeom>
-          <a:solidFill>
-            <a:srgbClr val="FFFFFF">
-              <a:shade val="85000"/>
-            </a:srgbClr>
-          </a:solidFill>
-          <a:ln w="101600" cap="sq">
-            <a:solidFill>
-              <a:srgbClr val="FDFDFD"/>
-            </a:solidFill>
-            <a:miter lim="800000"/>
-          </a:ln>
-          <a:effectLst>
-            <a:outerShdw blurRad="57150" dist="37500" dir="7560000" sy="98000" kx="110000" ky="200000" algn="tl" rotWithShape="0">
-              <a:srgbClr val="000000">
-                <a:alpha val="20000"/>
-              </a:srgbClr>
-            </a:outerShdw>
-          </a:effectLst>
-          <a:scene3d>
-            <a:camera prst="perspectiveRelaxed">
-              <a:rot lat="18960000" lon="0" rev="0"/>
-            </a:camera>
-            <a:lightRig rig="twoPt" dir="t">
-              <a:rot lat="0" lon="0" rev="7200000"/>
-            </a:lightRig>
-          </a:scene3d>
-          <a:sp3d prstMaterial="matte">
-            <a:bevelT w="22860" h="12700"/>
-            <a:contourClr>
-              <a:srgbClr val="FFFFFF"/>
-            </a:contourClr>
-          </a:sp3d>
-          <a:extLst/>
-        </p:spPr>
-      </p:pic>
-      <p:sp>
-        <p:nvSpPr>
-          <p:cNvPr id="4" name="Bildtext upp 3"/>
-          <p:cNvSpPr/>
-          <p:nvPr/>
-        </p:nvSpPr>
-        <p:spPr bwMode="auto">
-          <a:xfrm>
-            <a:off x="7536180" y="2770043"/>
-            <a:ext cx="1242060" cy="796756"/>
-          </a:xfrm>
-          <a:prstGeom prst="upArrowCallout">
-            <a:avLst/>
-          </a:prstGeom>
-          <a:solidFill>
-            <a:schemeClr val="tx2">
-              <a:lumMod val="20000"/>
-              <a:lumOff val="80000"/>
-            </a:schemeClr>
-          </a:solidFill>
-          <a:ln w="9525" cap="flat" cmpd="sng" algn="ctr">
-            <a:solidFill>
-              <a:schemeClr val="bg1">
-                <a:lumMod val="75000"/>
-              </a:schemeClr>
-            </a:solidFill>
-            <a:prstDash val="solid"/>
-            <a:round/>
-            <a:headEnd type="none" w="med" len="med"/>
-            <a:tailEnd type="none" w="med" len="med"/>
-          </a:ln>
-          <a:effectLst/>
-        </p:spPr>
-        <p:txBody>
-          <a:bodyPr vert="horz" wrap="square" lIns="90488" tIns="44450" rIns="90488" bIns="44450" numCol="1" rtlCol="0" anchor="t" anchorCtr="0" compatLnSpc="1">
-            <a:prstTxWarp prst="textNoShape">
-              <a:avLst/>
-            </a:prstTxWarp>
-          </a:bodyPr>
-          <a:lstStyle/>
-          <a:p>
-            <a:r>
-              <a:rPr lang="sv-SE" sz="800" dirty="0" smtClean="0">
-                <a:solidFill>
-                  <a:schemeClr val="bg1">
-                    <a:lumMod val="50000"/>
-                  </a:schemeClr>
-                </a:solidFill>
-                <a:latin typeface="Times New Roman" panose="02020603050405020304" pitchFamily="18" charset="0"/>
-                <a:cs typeface="Times New Roman" panose="02020603050405020304" pitchFamily="18" charset="0"/>
-              </a:rPr>
-              <a:t>Krävs eftersom vi i den partiella vyn har ett gömt fält för </a:t>
-            </a:r>
-            <a:r>
-              <a:rPr lang="sv-SE" sz="800" dirty="0" err="1" smtClean="0">
-                <a:solidFill>
-                  <a:schemeClr val="bg1">
-                    <a:lumMod val="50000"/>
-                  </a:schemeClr>
-                </a:solidFill>
-                <a:latin typeface="Times New Roman" panose="02020603050405020304" pitchFamily="18" charset="0"/>
-                <a:cs typeface="Times New Roman" panose="02020603050405020304" pitchFamily="18" charset="0"/>
-              </a:rPr>
-              <a:t>BirthdayId</a:t>
-            </a:r>
-            <a:r>
-              <a:rPr lang="sv-SE" sz="800" dirty="0" smtClean="0">
-                <a:solidFill>
-                  <a:schemeClr val="bg1">
-                    <a:lumMod val="50000"/>
-                  </a:schemeClr>
-                </a:solidFill>
-                <a:latin typeface="Times New Roman" panose="02020603050405020304" pitchFamily="18" charset="0"/>
-                <a:cs typeface="Times New Roman" panose="02020603050405020304" pitchFamily="18" charset="0"/>
-              </a:rPr>
-              <a:t>.</a:t>
-            </a:r>
-            <a:endParaRPr lang="sv-SE" sz="800" dirty="0">
-              <a:solidFill>
-                <a:schemeClr val="bg1">
-                  <a:lumMod val="50000"/>
-                </a:schemeClr>
-              </a:solidFill>
-              <a:latin typeface="Times New Roman" panose="02020603050405020304" pitchFamily="18" charset="0"/>
-              <a:cs typeface="Times New Roman" panose="02020603050405020304" pitchFamily="18" charset="0"/>
-            </a:endParaRPr>
-          </a:p>
-        </p:txBody>
-      </p:sp>
       <p:cxnSp>
         <p:nvCxnSpPr>
           <p:cNvPr id="17" name="Kurva 16"/>
           <p:cNvCxnSpPr>
-            <a:endCxn id="16" idx="0"/>
+            <a:endCxn id="16" idx="7"/>
           </p:cNvCxnSpPr>
           <p:nvPr/>
         </p:nvCxnSpPr>
         <p:spPr bwMode="auto">
           <a:xfrm rot="10800000" flipV="1">
-            <a:off x="5493544" y="1360153"/>
-            <a:ext cx="2626817" cy="1749062"/>
+            <a:off x="6419825" y="1443884"/>
+            <a:ext cx="1719836" cy="640861"/>
           </a:xfrm>
           <a:prstGeom prst="curvedConnector2">
             <a:avLst/>
@@ -7350,29 +6959,22 @@
       </p:grpSpPr>
       <p:pic>
         <p:nvPicPr>
-          <p:cNvPr id="5123" name="Picture 3"/>
+          <p:cNvPr id="5" name="Bildobjekt 4"/>
           <p:cNvPicPr>
-            <a:picLocks noChangeAspect="1" noChangeArrowheads="1"/>
+            <a:picLocks noChangeAspect="1"/>
           </p:cNvPicPr>
           <p:nvPr/>
         </p:nvPicPr>
         <p:blipFill>
-          <a:blip r:embed="rId2">
-            <a:extLst>
-              <a:ext uri="{28A0092B-C50C-407E-A947-70E740481C1C}">
-                <a14:useLocalDpi xmlns:a14="http://schemas.microsoft.com/office/drawing/2010/main" val="0"/>
-              </a:ext>
-            </a:extLst>
-          </a:blip>
-          <a:srcRect/>
+          <a:blip r:embed="rId2"/>
           <a:stretch>
             <a:fillRect/>
           </a:stretch>
         </p:blipFill>
-        <p:spPr bwMode="auto">
+        <p:spPr>
           <a:xfrm>
-            <a:off x="5541940" y="760766"/>
-            <a:ext cx="2353334" cy="1200000"/>
+            <a:off x="5693419" y="760766"/>
+            <a:ext cx="2260000" cy="1200000"/>
           </a:xfrm>
           <a:prstGeom prst="rect">
             <a:avLst/>
@@ -7409,319 +7011,26 @@
               <a:srgbClr val="969696"/>
             </a:contourClr>
           </a:sp3d>
-          <a:extLst/>
         </p:spPr>
       </p:pic>
-      <p:sp>
-        <p:nvSpPr>
-          <p:cNvPr id="3" name="Platshållare för innehåll 2"/>
-          <p:cNvSpPr>
-            <a:spLocks noGrp="1"/>
-          </p:cNvSpPr>
-          <p:nvPr>
-            <p:ph idx="1"/>
-          </p:nvPr>
-        </p:nvSpPr>
-        <p:spPr>
-          <a:xfrm>
-            <a:off x="457200" y="817563"/>
-            <a:ext cx="4732986" cy="4619625"/>
-          </a:xfrm>
-        </p:spPr>
-        <p:txBody>
-          <a:bodyPr/>
-          <a:lstStyle/>
-          <a:p>
-            <a:r>
-              <a:rPr lang="sv-SE" sz="1600" dirty="0" smtClean="0"/>
-              <a:t>Interfacet </a:t>
-            </a:r>
-            <a:r>
-              <a:rPr lang="sv-SE" sz="1400" dirty="0" smtClean="0">
-                <a:latin typeface="Courier New" pitchFamily="49" charset="0"/>
-                <a:cs typeface="Courier New" pitchFamily="49" charset="0"/>
-              </a:rPr>
-              <a:t>IRepository</a:t>
-            </a:r>
-            <a:r>
-              <a:rPr lang="sv-SE" sz="1600" dirty="0" smtClean="0"/>
-              <a:t> kompletteras med definitioner för metoder till för att hämta, ta bort och uppdatera födelsedata.</a:t>
-            </a:r>
-          </a:p>
-          <a:p>
-            <a:r>
-              <a:rPr lang="sv-SE" sz="1600" dirty="0" smtClean="0"/>
-              <a:t>Klassen </a:t>
-            </a:r>
-            <a:r>
-              <a:rPr lang="sv-SE" sz="1400" dirty="0" smtClean="0">
-                <a:latin typeface="Courier New" pitchFamily="49" charset="0"/>
-                <a:cs typeface="Courier New" pitchFamily="49" charset="0"/>
-              </a:rPr>
-              <a:t>EFRepsoitory</a:t>
-            </a:r>
-            <a:r>
-              <a:rPr lang="sv-SE" sz="1600" dirty="0" smtClean="0"/>
-              <a:t> måste implementera metoderna</a:t>
-            </a:r>
-            <a:r>
-              <a:rPr lang="sv-SE" sz="1600" dirty="0">
-                <a:latin typeface="Courier New" pitchFamily="49" charset="0"/>
-                <a:cs typeface="Courier New" pitchFamily="49" charset="0"/>
-              </a:rPr>
-              <a:t> </a:t>
-            </a:r>
-            <a:r>
-              <a:rPr lang="sv-SE" sz="1400" dirty="0" smtClean="0">
-                <a:latin typeface="Courier New" pitchFamily="49" charset="0"/>
-                <a:cs typeface="Courier New" pitchFamily="49" charset="0"/>
-              </a:rPr>
-              <a:t>GetBirthdayById</a:t>
-            </a:r>
-            <a:r>
-              <a:rPr lang="sv-SE" sz="1600" dirty="0"/>
-              <a:t> , </a:t>
-            </a:r>
-            <a:r>
-              <a:rPr lang="sv-SE" sz="1400" dirty="0" err="1" smtClean="0">
-                <a:latin typeface="Courier New" pitchFamily="49" charset="0"/>
-                <a:cs typeface="Courier New" pitchFamily="49" charset="0"/>
-              </a:rPr>
-              <a:t>DeleteBirthday</a:t>
-            </a:r>
-            <a:r>
-              <a:rPr lang="sv-SE" sz="1600" dirty="0" smtClean="0"/>
-              <a:t> och </a:t>
-            </a:r>
-            <a:r>
-              <a:rPr lang="sv-SE" sz="1400" dirty="0" err="1" smtClean="0">
-                <a:latin typeface="Courier New" pitchFamily="49" charset="0"/>
-                <a:cs typeface="Courier New" pitchFamily="49" charset="0"/>
-              </a:rPr>
-              <a:t>UpdateBirthday</a:t>
-            </a:r>
-            <a:r>
-              <a:rPr lang="sv-SE" sz="1600" dirty="0" smtClean="0"/>
-              <a:t>.</a:t>
-            </a:r>
-          </a:p>
-          <a:p>
-            <a:pPr lvl="1"/>
-            <a:r>
-              <a:rPr lang="sv-SE" sz="1400" dirty="0"/>
-              <a:t>Metoden </a:t>
-            </a:r>
-            <a:r>
-              <a:rPr lang="sv-SE" sz="1400" dirty="0">
-                <a:latin typeface="Courier New" pitchFamily="49" charset="0"/>
-                <a:cs typeface="Courier New" pitchFamily="49" charset="0"/>
-              </a:rPr>
-              <a:t>GetBirthdayById</a:t>
-            </a:r>
-            <a:r>
-              <a:rPr lang="sv-SE" sz="1400" dirty="0"/>
-              <a:t> returnerar ett </a:t>
-            </a:r>
-            <a:r>
-              <a:rPr lang="sv-SE" sz="1400" dirty="0">
-                <a:latin typeface="Courier New" pitchFamily="49" charset="0"/>
-                <a:cs typeface="Courier New" pitchFamily="49" charset="0"/>
-              </a:rPr>
-              <a:t>Birthday</a:t>
-            </a:r>
-            <a:r>
-              <a:rPr lang="sv-SE" sz="1400" dirty="0"/>
-              <a:t>-objekt med specificerat id. Hittas ingen post i databasen returneras </a:t>
-            </a:r>
-            <a:r>
-              <a:rPr lang="sv-SE" sz="1400" dirty="0">
-                <a:latin typeface="Courier New" pitchFamily="49" charset="0"/>
-                <a:cs typeface="Courier New" pitchFamily="49" charset="0"/>
-              </a:rPr>
-              <a:t>null</a:t>
-            </a:r>
-            <a:r>
-              <a:rPr lang="sv-SE" sz="1400" dirty="0"/>
-              <a:t>.</a:t>
-            </a:r>
-          </a:p>
-          <a:p>
-            <a:pPr lvl="1"/>
-            <a:r>
-              <a:rPr lang="sv-SE" sz="1400" dirty="0" smtClean="0"/>
-              <a:t>Metoden </a:t>
-            </a:r>
-            <a:r>
-              <a:rPr lang="sv-SE" sz="1400" dirty="0" err="1" smtClean="0">
-                <a:latin typeface="Courier New" pitchFamily="49" charset="0"/>
-                <a:ea typeface="+mn-ea"/>
-                <a:cs typeface="Courier New" pitchFamily="49" charset="0"/>
-              </a:rPr>
-              <a:t>DeleteBirthday</a:t>
-            </a:r>
-            <a:r>
-              <a:rPr lang="sv-SE" sz="1400" dirty="0" smtClean="0"/>
-              <a:t> anropar </a:t>
-            </a:r>
-            <a:r>
-              <a:rPr lang="sv-SE" sz="1400" dirty="0" err="1" smtClean="0">
-                <a:latin typeface="Courier New" pitchFamily="49" charset="0"/>
-                <a:ea typeface="+mn-ea"/>
-                <a:cs typeface="Courier New" pitchFamily="49" charset="0"/>
-              </a:rPr>
-              <a:t>Remove</a:t>
-            </a:r>
-            <a:r>
-              <a:rPr lang="sv-SE" sz="1400" dirty="0" smtClean="0"/>
-              <a:t>, som markerar att </a:t>
-            </a:r>
-            <a:r>
-              <a:rPr lang="sv-SE" sz="1400" dirty="0" smtClean="0">
-                <a:latin typeface="Courier New" pitchFamily="49" charset="0"/>
-                <a:ea typeface="+mn-ea"/>
-                <a:cs typeface="Courier New" pitchFamily="49" charset="0"/>
-              </a:rPr>
-              <a:t>Birthday</a:t>
-            </a:r>
-            <a:r>
-              <a:rPr lang="sv-SE" sz="1400" dirty="0" smtClean="0"/>
-              <a:t>-objektet ska tas bort. Först efter att </a:t>
-            </a:r>
-            <a:r>
-              <a:rPr lang="sv-SE" sz="1400" dirty="0" smtClean="0">
-                <a:latin typeface="Courier New" pitchFamily="49" charset="0"/>
-                <a:ea typeface="+mn-ea"/>
-                <a:cs typeface="Courier New" pitchFamily="49" charset="0"/>
-              </a:rPr>
-              <a:t>SaveChanges</a:t>
-            </a:r>
-            <a:r>
-              <a:rPr lang="sv-SE" sz="1400" dirty="0" smtClean="0"/>
-              <a:t> anropas tas posten bort i databasen.</a:t>
-            </a:r>
-          </a:p>
-          <a:p>
-            <a:pPr lvl="1"/>
-            <a:r>
-              <a:rPr lang="sv-SE" sz="1400" dirty="0"/>
-              <a:t>Metoden </a:t>
-            </a:r>
-            <a:r>
-              <a:rPr lang="sv-SE" sz="1400" dirty="0" err="1" smtClean="0">
-                <a:latin typeface="Courier New" pitchFamily="49" charset="0"/>
-                <a:cs typeface="Courier New" pitchFamily="49" charset="0"/>
-              </a:rPr>
-              <a:t>UpdateBirthday</a:t>
-            </a:r>
-            <a:r>
-              <a:rPr lang="sv-SE" sz="1400" dirty="0" smtClean="0"/>
-              <a:t> sätter status för </a:t>
-            </a:r>
-            <a:r>
-              <a:rPr lang="sv-SE" sz="1400" dirty="0" err="1" smtClean="0"/>
-              <a:t>entitiesobjektet</a:t>
-            </a:r>
-            <a:r>
-              <a:rPr lang="sv-SE" sz="1400" dirty="0" smtClean="0"/>
-              <a:t> vilket markerar </a:t>
-            </a:r>
-            <a:r>
-              <a:rPr lang="sv-SE" sz="1400" dirty="0"/>
-              <a:t>att </a:t>
-            </a:r>
-            <a:r>
-              <a:rPr lang="sv-SE" sz="1400" dirty="0">
-                <a:latin typeface="Courier New" pitchFamily="49" charset="0"/>
-                <a:cs typeface="Courier New" pitchFamily="49" charset="0"/>
-              </a:rPr>
-              <a:t>Birthday</a:t>
-            </a:r>
-            <a:r>
-              <a:rPr lang="sv-SE" sz="1400" dirty="0"/>
-              <a:t>-objektet ska </a:t>
-            </a:r>
-            <a:r>
-              <a:rPr lang="sv-SE" sz="1400" dirty="0" smtClean="0"/>
-              <a:t>uppdateras. </a:t>
-            </a:r>
-            <a:r>
-              <a:rPr lang="sv-SE" sz="1400" dirty="0"/>
-              <a:t>Först efter att </a:t>
-            </a:r>
-            <a:r>
-              <a:rPr lang="sv-SE" sz="1400" dirty="0">
-                <a:latin typeface="Courier New" pitchFamily="49" charset="0"/>
-                <a:cs typeface="Courier New" pitchFamily="49" charset="0"/>
-              </a:rPr>
-              <a:t>SaveChanges</a:t>
-            </a:r>
-            <a:r>
-              <a:rPr lang="sv-SE" sz="1400" dirty="0"/>
-              <a:t> anropas </a:t>
-            </a:r>
-            <a:r>
-              <a:rPr lang="sv-SE" sz="1400" dirty="0" smtClean="0"/>
-              <a:t>uppdateras posten i databasen</a:t>
-            </a:r>
-            <a:r>
-              <a:rPr lang="sv-SE" sz="1400" dirty="0"/>
-              <a:t>.</a:t>
-            </a:r>
-          </a:p>
-          <a:p>
-            <a:pPr lvl="1"/>
-            <a:endParaRPr lang="sv-SE" sz="1400" dirty="0" smtClean="0"/>
-          </a:p>
-        </p:txBody>
-      </p:sp>
-      <p:sp>
-        <p:nvSpPr>
-          <p:cNvPr id="2" name="Rubrik 1"/>
-          <p:cNvSpPr>
-            <a:spLocks noGrp="1"/>
-          </p:cNvSpPr>
-          <p:nvPr>
-            <p:ph type="title"/>
-          </p:nvPr>
-        </p:nvSpPr>
-        <p:spPr/>
-        <p:txBody>
-          <a:bodyPr/>
-          <a:lstStyle/>
-          <a:p>
-            <a:r>
-              <a:rPr lang="sv-SE" dirty="0" smtClean="0"/>
-              <a:t>Modifiering av interface och klass för ”repository”.</a:t>
-            </a:r>
-            <a:endParaRPr lang="sv-SE" dirty="0"/>
-          </a:p>
-        </p:txBody>
-      </p:sp>
       <p:pic>
         <p:nvPicPr>
-          <p:cNvPr id="5124" name="Picture 4"/>
+          <p:cNvPr id="4" name="Bildobjekt 3"/>
           <p:cNvPicPr>
-            <a:picLocks noChangeAspect="1" noChangeArrowheads="1"/>
+            <a:picLocks noChangeAspect="1"/>
           </p:cNvPicPr>
           <p:nvPr/>
         </p:nvPicPr>
         <p:blipFill>
-          <a:blip r:embed="rId3">
-            <a:extLst>
-              <a:ext uri="{28A0092B-C50C-407E-A947-70E740481C1C}">
-                <a14:useLocalDpi xmlns:a14="http://schemas.microsoft.com/office/drawing/2010/main" val="0"/>
-              </a:ext>
-            </a:extLst>
-          </a:blip>
-          <a:srcRect/>
+          <a:blip r:embed="rId3"/>
           <a:stretch>
             <a:fillRect/>
           </a:stretch>
         </p:blipFill>
-        <p:spPr bwMode="auto">
+        <p:spPr>
           <a:xfrm rot="720000">
-            <a:off x="5264346" y="1900215"/>
-            <a:ext cx="3613334" cy="4853334"/>
+            <a:off x="5331621" y="2004327"/>
+            <a:ext cx="4091533" cy="3990178"/>
           </a:xfrm>
           <a:prstGeom prst="rect">
             <a:avLst/>
@@ -7758,9 +7067,279 @@
               <a:srgbClr val="969696"/>
             </a:contourClr>
           </a:sp3d>
-          <a:extLst/>
         </p:spPr>
       </p:pic>
+      <p:sp>
+        <p:nvSpPr>
+          <p:cNvPr id="3" name="Platshållare för innehåll 2"/>
+          <p:cNvSpPr>
+            <a:spLocks noGrp="1"/>
+          </p:cNvSpPr>
+          <p:nvPr>
+            <p:ph idx="1"/>
+          </p:nvPr>
+        </p:nvSpPr>
+        <p:spPr>
+          <a:xfrm>
+            <a:off x="457200" y="817563"/>
+            <a:ext cx="4732986" cy="4619625"/>
+          </a:xfrm>
+        </p:spPr>
+        <p:txBody>
+          <a:bodyPr/>
+          <a:lstStyle/>
+          <a:p>
+            <a:r>
+              <a:rPr lang="sv-SE" sz="1600" dirty="0" smtClean="0"/>
+              <a:t>Interfacet </a:t>
+            </a:r>
+            <a:r>
+              <a:rPr lang="sv-SE" sz="1400" dirty="0" smtClean="0">
+                <a:latin typeface="Courier New" pitchFamily="49" charset="0"/>
+                <a:cs typeface="Courier New" pitchFamily="49" charset="0"/>
+              </a:rPr>
+              <a:t>IRepository</a:t>
+            </a:r>
+            <a:r>
+              <a:rPr lang="sv-SE" sz="1600" dirty="0" smtClean="0"/>
+              <a:t> kompletteras med definitioner för metoder till för att hämta, ta bort och uppdatera födelsedata.</a:t>
+            </a:r>
+          </a:p>
+          <a:p>
+            <a:r>
+              <a:rPr lang="sv-SE" sz="1600" dirty="0" smtClean="0"/>
+              <a:t>Klassen </a:t>
+            </a:r>
+            <a:r>
+              <a:rPr lang="sv-SE" sz="1400" dirty="0" smtClean="0">
+                <a:latin typeface="Courier New" pitchFamily="49" charset="0"/>
+                <a:cs typeface="Courier New" pitchFamily="49" charset="0"/>
+              </a:rPr>
+              <a:t>EFRepsoitory</a:t>
+            </a:r>
+            <a:r>
+              <a:rPr lang="sv-SE" sz="1600" dirty="0" smtClean="0"/>
+              <a:t> måste implementera metoderna</a:t>
+            </a:r>
+            <a:r>
+              <a:rPr lang="sv-SE" sz="1600" dirty="0">
+                <a:latin typeface="Courier New" pitchFamily="49" charset="0"/>
+                <a:cs typeface="Courier New" pitchFamily="49" charset="0"/>
+              </a:rPr>
+              <a:t> </a:t>
+            </a:r>
+            <a:r>
+              <a:rPr lang="sv-SE" sz="1400" dirty="0" smtClean="0">
+                <a:latin typeface="Courier New" pitchFamily="49" charset="0"/>
+                <a:cs typeface="Courier New" pitchFamily="49" charset="0"/>
+              </a:rPr>
+              <a:t>GetBirthdayById</a:t>
+            </a:r>
+            <a:r>
+              <a:rPr lang="sv-SE" sz="1600" dirty="0"/>
+              <a:t> , </a:t>
+            </a:r>
+            <a:r>
+              <a:rPr lang="sv-SE" sz="1400" dirty="0" err="1" smtClean="0">
+                <a:latin typeface="Courier New" pitchFamily="49" charset="0"/>
+                <a:cs typeface="Courier New" pitchFamily="49" charset="0"/>
+              </a:rPr>
+              <a:t>UpdateBirthday</a:t>
+            </a:r>
+            <a:r>
+              <a:rPr lang="sv-SE" sz="1400" dirty="0"/>
+              <a:t> </a:t>
+            </a:r>
+            <a:r>
+              <a:rPr lang="sv-SE" sz="1600" dirty="0" smtClean="0"/>
+              <a:t>och </a:t>
+            </a:r>
+            <a:r>
+              <a:rPr lang="sv-SE" sz="1600" dirty="0" err="1">
+                <a:latin typeface="Courier New" pitchFamily="49" charset="0"/>
+                <a:cs typeface="Courier New" pitchFamily="49" charset="0"/>
+              </a:rPr>
+              <a:t>DeleteBirthday</a:t>
+            </a:r>
+            <a:r>
+              <a:rPr lang="sv-SE" sz="1600" dirty="0" smtClean="0"/>
+              <a:t>.</a:t>
+            </a:r>
+            <a:endParaRPr lang="sv-SE" sz="1600" dirty="0" smtClean="0"/>
+          </a:p>
+          <a:p>
+            <a:pPr lvl="1"/>
+            <a:r>
+              <a:rPr lang="sv-SE" sz="1400" dirty="0"/>
+              <a:t>Metoden </a:t>
+            </a:r>
+            <a:r>
+              <a:rPr lang="sv-SE" sz="1400" dirty="0">
+                <a:latin typeface="Courier New" pitchFamily="49" charset="0"/>
+                <a:cs typeface="Courier New" pitchFamily="49" charset="0"/>
+              </a:rPr>
+              <a:t>GetBirthdayById</a:t>
+            </a:r>
+            <a:r>
+              <a:rPr lang="sv-SE" sz="1400" dirty="0"/>
+              <a:t> returnerar ett </a:t>
+            </a:r>
+            <a:r>
+              <a:rPr lang="sv-SE" sz="1400" dirty="0">
+                <a:latin typeface="Courier New" pitchFamily="49" charset="0"/>
+                <a:cs typeface="Courier New" pitchFamily="49" charset="0"/>
+              </a:rPr>
+              <a:t>Birthday</a:t>
+            </a:r>
+            <a:r>
+              <a:rPr lang="sv-SE" sz="1400" dirty="0"/>
+              <a:t>-objekt med specificerat id. Hittas ingen post i databasen returneras </a:t>
+            </a:r>
+            <a:r>
+              <a:rPr lang="sv-SE" sz="1400" dirty="0" err="1">
+                <a:latin typeface="Courier New" pitchFamily="49" charset="0"/>
+                <a:cs typeface="Courier New" pitchFamily="49" charset="0"/>
+              </a:rPr>
+              <a:t>null</a:t>
+            </a:r>
+            <a:r>
+              <a:rPr lang="sv-SE" sz="1400" dirty="0" smtClean="0"/>
+              <a:t>.</a:t>
+            </a:r>
+          </a:p>
+          <a:p>
+            <a:pPr lvl="1"/>
+            <a:r>
+              <a:rPr lang="sv-SE" sz="1400" dirty="0"/>
+              <a:t>Metoden </a:t>
+            </a:r>
+            <a:r>
+              <a:rPr lang="sv-SE" sz="1400" dirty="0" err="1">
+                <a:latin typeface="Courier New" pitchFamily="49" charset="0"/>
+                <a:cs typeface="Courier New" pitchFamily="49" charset="0"/>
+              </a:rPr>
+              <a:t>UpdateBirthday</a:t>
+            </a:r>
+            <a:r>
+              <a:rPr lang="sv-SE" sz="1400" dirty="0"/>
+              <a:t> sätter status för </a:t>
+            </a:r>
+            <a:r>
+              <a:rPr lang="sv-SE" sz="1400" dirty="0" err="1"/>
+              <a:t>entitiesobjektet</a:t>
+            </a:r>
+            <a:r>
+              <a:rPr lang="sv-SE" sz="1400" dirty="0"/>
+              <a:t> vilket markerar att </a:t>
+            </a:r>
+            <a:r>
+              <a:rPr lang="sv-SE" sz="1400" dirty="0" err="1">
+                <a:latin typeface="Courier New" pitchFamily="49" charset="0"/>
+                <a:cs typeface="Courier New" pitchFamily="49" charset="0"/>
+              </a:rPr>
+              <a:t>Birthday</a:t>
+            </a:r>
+            <a:r>
+              <a:rPr lang="sv-SE" sz="1400" dirty="0"/>
+              <a:t>-objektet ska uppdateras. Först efter att </a:t>
+            </a:r>
+            <a:r>
+              <a:rPr lang="sv-SE" sz="1400" dirty="0" err="1">
+                <a:latin typeface="Courier New" pitchFamily="49" charset="0"/>
+                <a:cs typeface="Courier New" pitchFamily="49" charset="0"/>
+              </a:rPr>
+              <a:t>SaveChanges</a:t>
+            </a:r>
+            <a:r>
+              <a:rPr lang="sv-SE" sz="1400" dirty="0"/>
+              <a:t> anropas uppdateras posten i databasen.</a:t>
+            </a:r>
+          </a:p>
+          <a:p>
+            <a:pPr lvl="1"/>
+            <a:r>
+              <a:rPr lang="sv-SE" sz="1400" dirty="0" smtClean="0"/>
+              <a:t>Metoden </a:t>
+            </a:r>
+            <a:r>
+              <a:rPr lang="sv-SE" sz="1400" dirty="0" err="1" smtClean="0">
+                <a:latin typeface="Courier New" pitchFamily="49" charset="0"/>
+                <a:ea typeface="+mn-ea"/>
+                <a:cs typeface="Courier New" pitchFamily="49" charset="0"/>
+              </a:rPr>
+              <a:t>DeleteBirthday</a:t>
+            </a:r>
+            <a:r>
+              <a:rPr lang="sv-SE" sz="1400" dirty="0" smtClean="0"/>
+              <a:t> anropar </a:t>
+            </a:r>
+            <a:r>
+              <a:rPr lang="sv-SE" sz="1400" dirty="0" err="1" smtClean="0">
+                <a:latin typeface="Courier New" pitchFamily="49" charset="0"/>
+                <a:ea typeface="+mn-ea"/>
+                <a:cs typeface="Courier New" pitchFamily="49" charset="0"/>
+              </a:rPr>
+              <a:t>Remove</a:t>
+            </a:r>
+            <a:r>
+              <a:rPr lang="sv-SE" sz="1400" dirty="0" smtClean="0"/>
+              <a:t>, som markerar att </a:t>
+            </a:r>
+            <a:r>
+              <a:rPr lang="sv-SE" sz="1400" dirty="0" smtClean="0">
+                <a:latin typeface="Courier New" pitchFamily="49" charset="0"/>
+                <a:ea typeface="+mn-ea"/>
+                <a:cs typeface="Courier New" pitchFamily="49" charset="0"/>
+              </a:rPr>
+              <a:t>Birthday</a:t>
+            </a:r>
+            <a:r>
+              <a:rPr lang="sv-SE" sz="1400" dirty="0" smtClean="0"/>
+              <a:t>-objektet ska tas bort. Först efter att </a:t>
+            </a:r>
+            <a:r>
+              <a:rPr lang="sv-SE" sz="1400" dirty="0" smtClean="0">
+                <a:latin typeface="Courier New" pitchFamily="49" charset="0"/>
+                <a:ea typeface="+mn-ea"/>
+                <a:cs typeface="Courier New" pitchFamily="49" charset="0"/>
+              </a:rPr>
+              <a:t>SaveChanges</a:t>
+            </a:r>
+            <a:r>
+              <a:rPr lang="sv-SE" sz="1400" dirty="0" smtClean="0"/>
+              <a:t> anropas tas posten bort i databasen.</a:t>
+            </a:r>
+            <a:endParaRPr lang="sv-SE" sz="1400" dirty="0"/>
+          </a:p>
+          <a:p>
+            <a:pPr lvl="1"/>
+            <a:endParaRPr lang="sv-SE" sz="1400" dirty="0" smtClean="0"/>
+          </a:p>
+        </p:txBody>
+      </p:sp>
+      <p:sp>
+        <p:nvSpPr>
+          <p:cNvPr id="2" name="Rubrik 1"/>
+          <p:cNvSpPr>
+            <a:spLocks noGrp="1"/>
+          </p:cNvSpPr>
+          <p:nvPr>
+            <p:ph type="title"/>
+          </p:nvPr>
+        </p:nvSpPr>
+        <p:spPr/>
+        <p:txBody>
+          <a:bodyPr/>
+          <a:lstStyle/>
+          <a:p>
+            <a:r>
+              <a:rPr lang="sv-SE" dirty="0" smtClean="0"/>
+              <a:t>Modifiering av interface och klass för ”repository”.</a:t>
+            </a:r>
+            <a:endParaRPr lang="sv-SE" dirty="0"/>
+          </a:p>
+        </p:txBody>
+      </p:sp>
     </p:spTree>
   </p:cSld>
   <p:clrMapOvr>
@@ -7798,13 +7377,13 @@
       </p:grpSpPr>
       <p:sp>
         <p:nvSpPr>
-          <p:cNvPr id="23" name="Ellips 22"/>
+          <p:cNvPr id="6" name="Ellips 5"/>
           <p:cNvSpPr/>
           <p:nvPr/>
         </p:nvSpPr>
         <p:spPr bwMode="auto">
           <a:xfrm>
-            <a:off x="4935719" y="3471341"/>
+            <a:off x="2362135" y="2963993"/>
             <a:ext cx="118412" cy="118412"/>
           </a:xfrm>
           <a:prstGeom prst="ellipse">
@@ -7863,13 +7442,13 @@
       </p:sp>
       <p:sp>
         <p:nvSpPr>
-          <p:cNvPr id="6" name="Ellips 5"/>
+          <p:cNvPr id="21" name="Ellips 20"/>
           <p:cNvSpPr/>
           <p:nvPr/>
         </p:nvSpPr>
         <p:spPr bwMode="auto">
           <a:xfrm>
-            <a:off x="2664259" y="3187975"/>
+            <a:off x="3171758" y="3672947"/>
             <a:ext cx="118412" cy="118412"/>
           </a:xfrm>
           <a:prstGeom prst="ellipse">
@@ -7928,13 +7507,13 @@
       </p:sp>
       <p:sp>
         <p:nvSpPr>
-          <p:cNvPr id="16" name="Ellips 15"/>
+          <p:cNvPr id="25" name="Ellips 24"/>
           <p:cNvSpPr/>
           <p:nvPr/>
         </p:nvSpPr>
         <p:spPr bwMode="auto">
           <a:xfrm>
-            <a:off x="1677496" y="4042368"/>
+            <a:off x="2347900" y="3450810"/>
             <a:ext cx="118412" cy="118412"/>
           </a:xfrm>
           <a:prstGeom prst="ellipse">
@@ -7991,147 +7570,24 @@
           </a:p>
         </p:txBody>
       </p:sp>
-      <p:sp>
-        <p:nvSpPr>
-          <p:cNvPr id="21" name="Ellips 20"/>
-          <p:cNvSpPr/>
-          <p:nvPr/>
-        </p:nvSpPr>
-        <p:spPr bwMode="auto">
-          <a:xfrm>
-            <a:off x="3974467" y="3422372"/>
-            <a:ext cx="118412" cy="118412"/>
-          </a:xfrm>
-          <a:prstGeom prst="ellipse">
-            <a:avLst/>
-          </a:prstGeom>
-          <a:solidFill>
-            <a:schemeClr val="accent1"/>
-          </a:solidFill>
-          <a:ln w="9525" cap="flat" cmpd="sng" algn="ctr">
-            <a:solidFill>
-              <a:schemeClr val="tx1"/>
-            </a:solidFill>
-            <a:prstDash val="solid"/>
-            <a:round/>
-            <a:headEnd type="none" w="med" len="med"/>
-            <a:tailEnd type="none" w="med" len="med"/>
-          </a:ln>
-          <a:effectLst/>
-        </p:spPr>
-        <p:txBody>
-          <a:bodyPr vert="horz" wrap="square" lIns="90488" tIns="44450" rIns="90488" bIns="44450" numCol="1" rtlCol="0" anchor="t" anchorCtr="0" compatLnSpc="1">
-            <a:prstTxWarp prst="textNoShape">
-              <a:avLst/>
-            </a:prstTxWarp>
-          </a:bodyPr>
-          <a:lstStyle/>
-          <a:p>
-            <a:pPr marL="0" marR="0" indent="0" algn="l" defTabSz="914400" rtl="0" eaLnBrk="1" fontAlgn="base" latinLnBrk="0" hangingPunct="1">
-              <a:lnSpc>
-                <a:spcPct val="100000"/>
-              </a:lnSpc>
-              <a:spcBef>
-                <a:spcPct val="0"/>
-              </a:spcBef>
-              <a:spcAft>
-                <a:spcPct val="0"/>
-              </a:spcAft>
-              <a:buClrTx/>
-              <a:buSzTx/>
-              <a:buFontTx/>
-              <a:buNone/>
-              <a:tabLst/>
-            </a:pPr>
-            <a:endParaRPr kumimoji="0" lang="sv-SE" sz="1800" b="0" i="0" u="none" strike="noStrike" cap="none" normalizeH="0" baseline="0" smtClean="0">
-              <a:ln>
-                <a:noFill/>
-              </a:ln>
-              <a:solidFill>
-                <a:schemeClr val="tx1"/>
-              </a:solidFill>
-              <a:effectLst/>
-              <a:latin typeface="Arial" charset="0"/>
-            </a:endParaRPr>
-          </a:p>
-        </p:txBody>
-      </p:sp>
-      <p:sp>
-        <p:nvSpPr>
-          <p:cNvPr id="3" name="Platshållare för innehåll 2"/>
-          <p:cNvSpPr>
-            <a:spLocks noGrp="1"/>
-          </p:cNvSpPr>
-          <p:nvPr>
-            <p:ph idx="1"/>
-          </p:nvPr>
-        </p:nvSpPr>
-        <p:spPr/>
-        <p:txBody>
-          <a:bodyPr/>
-          <a:lstStyle/>
-          <a:p>
-            <a:r>
-              <a:rPr lang="sv-SE" dirty="0" smtClean="0"/>
-              <a:t>Födelsedatat som ska redigeras specificeras med hjälp av primärnyckelns värde, som skickas till controllermetoden så att rätt post med födelsedata kan hämtas från databasen.</a:t>
-            </a:r>
-          </a:p>
-          <a:p>
-            <a:r>
-              <a:rPr lang="sv-SE" dirty="0" smtClean="0"/>
-              <a:t>Födelsedatat, paketerat i ett </a:t>
-            </a:r>
-            <a:r>
-              <a:rPr lang="sv-SE" sz="1600" dirty="0" smtClean="0">
-                <a:latin typeface="Courier New" pitchFamily="49" charset="0"/>
-                <a:cs typeface="Courier New" pitchFamily="49" charset="0"/>
-              </a:rPr>
-              <a:t>Birthday</a:t>
-            </a:r>
-            <a:r>
-              <a:rPr lang="sv-SE" dirty="0" smtClean="0"/>
-              <a:t>-objekt, utgör modellen som skickas till vyn som visar födelsedatat i ett formulär. Hittas inte någon post med specificerat id visas vyn </a:t>
-            </a:r>
-            <a:r>
-              <a:rPr lang="sv-SE" sz="1600" dirty="0" err="1" smtClean="0">
-                <a:latin typeface="Courier New" pitchFamily="49" charset="0"/>
-                <a:cs typeface="Courier New" pitchFamily="49" charset="0"/>
-              </a:rPr>
-              <a:t>NotFound</a:t>
-            </a:r>
-            <a:r>
-              <a:rPr lang="sv-SE" dirty="0" smtClean="0"/>
-              <a:t>.</a:t>
-            </a:r>
-            <a:endParaRPr lang="sv-SE" dirty="0"/>
-          </a:p>
-        </p:txBody>
-      </p:sp>
       <p:pic>
         <p:nvPicPr>
-          <p:cNvPr id="6147" name="Picture 3"/>
+          <p:cNvPr id="10" name="Bildobjekt 9"/>
           <p:cNvPicPr>
-            <a:picLocks noChangeAspect="1" noChangeArrowheads="1"/>
+            <a:picLocks noChangeAspect="1"/>
           </p:cNvPicPr>
           <p:nvPr/>
         </p:nvPicPr>
         <p:blipFill>
-          <a:blip r:embed="rId2">
-            <a:extLst>
-              <a:ext uri="{28A0092B-C50C-407E-A947-70E740481C1C}">
-                <a14:useLocalDpi xmlns:a14="http://schemas.microsoft.com/office/drawing/2010/main" val="0"/>
-              </a:ext>
-            </a:extLst>
-          </a:blip>
-          <a:srcRect/>
+          <a:blip r:embed="rId2"/>
           <a:stretch>
             <a:fillRect/>
           </a:stretch>
         </p:blipFill>
-        <p:spPr bwMode="auto">
+        <p:spPr>
           <a:xfrm rot="21420000">
-            <a:off x="2311861" y="2524939"/>
-            <a:ext cx="2633334" cy="1306667"/>
+            <a:off x="1897727" y="2267630"/>
+            <a:ext cx="3419390" cy="1877730"/>
           </a:xfrm>
           <a:prstGeom prst="rect">
             <a:avLst/>
@@ -8168,12 +7624,206 @@
               <a:srgbClr val="FFFFFF"/>
             </a:contourClr>
           </a:sp3d>
-          <a:extLst/>
         </p:spPr>
       </p:pic>
+      <p:sp>
+        <p:nvSpPr>
+          <p:cNvPr id="23" name="Ellips 22"/>
+          <p:cNvSpPr/>
+          <p:nvPr/>
+        </p:nvSpPr>
+        <p:spPr bwMode="auto">
+          <a:xfrm>
+            <a:off x="5304704" y="3488285"/>
+            <a:ext cx="118412" cy="118412"/>
+          </a:xfrm>
+          <a:prstGeom prst="ellipse">
+            <a:avLst/>
+          </a:prstGeom>
+          <a:solidFill>
+            <a:schemeClr val="accent1"/>
+          </a:solidFill>
+          <a:ln w="9525" cap="flat" cmpd="sng" algn="ctr">
+            <a:solidFill>
+              <a:schemeClr val="tx1"/>
+            </a:solidFill>
+            <a:prstDash val="solid"/>
+            <a:round/>
+            <a:headEnd type="none" w="med" len="med"/>
+            <a:tailEnd type="none" w="med" len="med"/>
+          </a:ln>
+          <a:effectLst/>
+        </p:spPr>
+        <p:txBody>
+          <a:bodyPr vert="horz" wrap="square" lIns="90488" tIns="44450" rIns="90488" bIns="44450" numCol="1" rtlCol="0" anchor="t" anchorCtr="0" compatLnSpc="1">
+            <a:prstTxWarp prst="textNoShape">
+              <a:avLst/>
+            </a:prstTxWarp>
+          </a:bodyPr>
+          <a:lstStyle/>
+          <a:p>
+            <a:pPr marL="0" marR="0" indent="0" algn="l" defTabSz="914400" rtl="0" eaLnBrk="1" fontAlgn="base" latinLnBrk="0" hangingPunct="1">
+              <a:lnSpc>
+                <a:spcPct val="100000"/>
+              </a:lnSpc>
+              <a:spcBef>
+                <a:spcPct val="0"/>
+              </a:spcBef>
+              <a:spcAft>
+                <a:spcPct val="0"/>
+              </a:spcAft>
+              <a:buClrTx/>
+              <a:buSzTx/>
+              <a:buFontTx/>
+              <a:buNone/>
+              <a:tabLst/>
+            </a:pPr>
+            <a:endParaRPr kumimoji="0" lang="sv-SE" sz="1800" b="0" i="0" u="none" strike="noStrike" cap="none" normalizeH="0" baseline="0" smtClean="0">
+              <a:ln>
+                <a:noFill/>
+              </a:ln>
+              <a:solidFill>
+                <a:schemeClr val="tx1"/>
+              </a:solidFill>
+              <a:effectLst/>
+              <a:latin typeface="Arial" charset="0"/>
+            </a:endParaRPr>
+          </a:p>
+        </p:txBody>
+      </p:sp>
+      <p:sp>
+        <p:nvSpPr>
+          <p:cNvPr id="16" name="Ellips 15"/>
+          <p:cNvSpPr/>
+          <p:nvPr/>
+        </p:nvSpPr>
+        <p:spPr bwMode="auto">
+          <a:xfrm>
+            <a:off x="1134165" y="4155825"/>
+            <a:ext cx="118412" cy="118412"/>
+          </a:xfrm>
+          <a:prstGeom prst="ellipse">
+            <a:avLst/>
+          </a:prstGeom>
+          <a:solidFill>
+            <a:schemeClr val="accent1"/>
+          </a:solidFill>
+          <a:ln w="9525" cap="flat" cmpd="sng" algn="ctr">
+            <a:solidFill>
+              <a:schemeClr val="tx1"/>
+            </a:solidFill>
+            <a:prstDash val="solid"/>
+            <a:round/>
+            <a:headEnd type="none" w="med" len="med"/>
+            <a:tailEnd type="none" w="med" len="med"/>
+          </a:ln>
+          <a:effectLst/>
+        </p:spPr>
+        <p:txBody>
+          <a:bodyPr vert="horz" wrap="square" lIns="90488" tIns="44450" rIns="90488" bIns="44450" numCol="1" rtlCol="0" anchor="t" anchorCtr="0" compatLnSpc="1">
+            <a:prstTxWarp prst="textNoShape">
+              <a:avLst/>
+            </a:prstTxWarp>
+          </a:bodyPr>
+          <a:lstStyle/>
+          <a:p>
+            <a:pPr marL="0" marR="0" indent="0" algn="l" defTabSz="914400" rtl="0" eaLnBrk="1" fontAlgn="base" latinLnBrk="0" hangingPunct="1">
+              <a:lnSpc>
+                <a:spcPct val="100000"/>
+              </a:lnSpc>
+              <a:spcBef>
+                <a:spcPct val="0"/>
+              </a:spcBef>
+              <a:spcAft>
+                <a:spcPct val="0"/>
+              </a:spcAft>
+              <a:buClrTx/>
+              <a:buSzTx/>
+              <a:buFontTx/>
+              <a:buNone/>
+              <a:tabLst/>
+            </a:pPr>
+            <a:endParaRPr kumimoji="0" lang="sv-SE" sz="1800" b="0" i="0" u="none" strike="noStrike" cap="none" normalizeH="0" baseline="0" smtClean="0">
+              <a:ln>
+                <a:noFill/>
+              </a:ln>
+              <a:solidFill>
+                <a:schemeClr val="tx1"/>
+              </a:solidFill>
+              <a:effectLst/>
+              <a:latin typeface="Arial" charset="0"/>
+            </a:endParaRPr>
+          </a:p>
+        </p:txBody>
+      </p:sp>
+      <p:sp>
+        <p:nvSpPr>
+          <p:cNvPr id="26" name="Ellips 25"/>
+          <p:cNvSpPr/>
+          <p:nvPr/>
+        </p:nvSpPr>
+        <p:spPr bwMode="auto">
+          <a:xfrm>
+            <a:off x="1477208" y="4455985"/>
+            <a:ext cx="118412" cy="118412"/>
+          </a:xfrm>
+          <a:prstGeom prst="ellipse">
+            <a:avLst/>
+          </a:prstGeom>
+          <a:solidFill>
+            <a:schemeClr val="accent1"/>
+          </a:solidFill>
+          <a:ln w="9525" cap="flat" cmpd="sng" algn="ctr">
+            <a:solidFill>
+              <a:schemeClr val="tx1"/>
+            </a:solidFill>
+            <a:prstDash val="solid"/>
+            <a:round/>
+            <a:headEnd type="none" w="med" len="med"/>
+            <a:tailEnd type="none" w="med" len="med"/>
+          </a:ln>
+          <a:effectLst/>
+        </p:spPr>
+        <p:txBody>
+          <a:bodyPr vert="horz" wrap="square" lIns="90488" tIns="44450" rIns="90488" bIns="44450" numCol="1" rtlCol="0" anchor="t" anchorCtr="0" compatLnSpc="1">
+            <a:prstTxWarp prst="textNoShape">
+              <a:avLst/>
+            </a:prstTxWarp>
+          </a:bodyPr>
+          <a:lstStyle/>
+          <a:p>
+            <a:pPr marL="0" marR="0" indent="0" algn="l" defTabSz="914400" rtl="0" eaLnBrk="1" fontAlgn="base" latinLnBrk="0" hangingPunct="1">
+              <a:lnSpc>
+                <a:spcPct val="100000"/>
+              </a:lnSpc>
+              <a:spcBef>
+                <a:spcPct val="0"/>
+              </a:spcBef>
+              <a:spcAft>
+                <a:spcPct val="0"/>
+              </a:spcAft>
+              <a:buClrTx/>
+              <a:buSzTx/>
+              <a:buFontTx/>
+              <a:buNone/>
+              <a:tabLst/>
+            </a:pPr>
+            <a:endParaRPr kumimoji="0" lang="sv-SE" sz="1800" b="0" i="0" u="none" strike="noStrike" cap="none" normalizeH="0" baseline="0" smtClean="0">
+              <a:ln>
+                <a:noFill/>
+              </a:ln>
+              <a:solidFill>
+                <a:schemeClr val="tx1"/>
+              </a:solidFill>
+              <a:effectLst/>
+              <a:latin typeface="Arial" charset="0"/>
+            </a:endParaRPr>
+          </a:p>
+        </p:txBody>
+      </p:sp>
       <p:pic>
         <p:nvPicPr>
-          <p:cNvPr id="6148" name="Picture 4"/>
+          <p:cNvPr id="1026" name="Picture 2" descr="C:\Users\mats\AppData\Local\Temp\SNAGHTML8f9e7ac.PNG"/>
           <p:cNvPicPr>
             <a:picLocks noChangeAspect="1" noChangeArrowheads="1"/>
           </p:cNvPicPr>
@@ -8181,6 +7831,7 @@
         </p:nvPicPr>
         <p:blipFill>
           <a:blip r:embed="rId3">
+            <a:grayscl/>
             <a:extLst>
               <a:ext uri="{28A0092B-C50C-407E-A947-70E740481C1C}">
                 <a14:useLocalDpi xmlns:a14="http://schemas.microsoft.com/office/drawing/2010/main" val="0"/>
@@ -8194,8 +7845,84 @@
         </p:blipFill>
         <p:spPr bwMode="auto">
           <a:xfrm rot="21180000">
-            <a:off x="842846" y="3692200"/>
-            <a:ext cx="3526667" cy="1540000"/>
+            <a:off x="-111234" y="3996815"/>
+            <a:ext cx="3232684" cy="1883065"/>
+          </a:xfrm>
+          <a:prstGeom prst="rect">
+            <a:avLst/>
+          </a:prstGeom>
+          <a:noFill/>
+          <a:extLst>
+            <a:ext uri="{909E8E84-426E-40DD-AFC4-6F175D3DCCD1}">
+              <a14:hiddenFill xmlns:a14="http://schemas.microsoft.com/office/drawing/2010/main">
+                <a:solidFill>
+                  <a:srgbClr val="FFFFFF"/>
+                </a:solidFill>
+              </a14:hiddenFill>
+            </a:ext>
+          </a:extLst>
+        </p:spPr>
+      </p:pic>
+      <p:pic>
+        <p:nvPicPr>
+          <p:cNvPr id="1028" name="Picture 4" descr="C:\Users\mats\AppData\Local\Temp\SNAGHTML8fb0b5b.PNG"/>
+          <p:cNvPicPr>
+            <a:picLocks noChangeAspect="1" noChangeArrowheads="1"/>
+          </p:cNvPicPr>
+          <p:nvPr/>
+        </p:nvPicPr>
+        <p:blipFill>
+          <a:blip r:embed="rId4">
+            <a:grayscl/>
+            <a:extLst>
+              <a:ext uri="{28A0092B-C50C-407E-A947-70E740481C1C}">
+                <a14:useLocalDpi xmlns:a14="http://schemas.microsoft.com/office/drawing/2010/main" val="0"/>
+              </a:ext>
+            </a:extLst>
+          </a:blip>
+          <a:srcRect/>
+          <a:stretch>
+            <a:fillRect/>
+          </a:stretch>
+        </p:blipFill>
+        <p:spPr bwMode="auto">
+          <a:xfrm rot="20856002">
+            <a:off x="217564" y="4286302"/>
+            <a:ext cx="3270026" cy="1867062"/>
+          </a:xfrm>
+          <a:prstGeom prst="rect">
+            <a:avLst/>
+          </a:prstGeom>
+          <a:noFill/>
+          <a:extLst>
+            <a:ext uri="{909E8E84-426E-40DD-AFC4-6F175D3DCCD1}">
+              <a14:hiddenFill xmlns:a14="http://schemas.microsoft.com/office/drawing/2010/main">
+                <a:solidFill>
+                  <a:srgbClr val="FFFFFF"/>
+                </a:solidFill>
+              </a14:hiddenFill>
+            </a:ext>
+          </a:extLst>
+        </p:spPr>
+      </p:pic>
+      <p:pic>
+        <p:nvPicPr>
+          <p:cNvPr id="7" name="Bildobjekt 6"/>
+          <p:cNvPicPr>
+            <a:picLocks noChangeAspect="1"/>
+          </p:cNvPicPr>
+          <p:nvPr/>
+        </p:nvPicPr>
+        <p:blipFill>
+          <a:blip r:embed="rId5"/>
+          <a:stretch>
+            <a:fillRect/>
+          </a:stretch>
+        </p:blipFill>
+        <p:spPr>
+          <a:xfrm rot="420000">
+            <a:off x="5096319" y="1871963"/>
+            <a:ext cx="3158002" cy="4411600"/>
           </a:xfrm>
           <a:prstGeom prst="rect">
             <a:avLst/>
@@ -8232,9 +7959,60 @@
               <a:srgbClr val="FFFFFF"/>
             </a:contourClr>
           </a:sp3d>
-          <a:extLst/>
         </p:spPr>
       </p:pic>
+      <p:sp>
+        <p:nvSpPr>
+          <p:cNvPr id="3" name="Platshållare för innehåll 2"/>
+          <p:cNvSpPr>
+            <a:spLocks noGrp="1"/>
+          </p:cNvSpPr>
+          <p:nvPr>
+            <p:ph idx="1"/>
+          </p:nvPr>
+        </p:nvSpPr>
+        <p:spPr/>
+        <p:txBody>
+          <a:bodyPr/>
+          <a:lstStyle/>
+          <a:p>
+            <a:r>
+              <a:rPr lang="sv-SE" dirty="0" smtClean="0"/>
+              <a:t>Födelsedatat som ska redigeras specificeras med hjälp av primärnyckelns värde, som skickas till controllermetoden så att rätt post med födelsedata kan hämtas från databasen.</a:t>
+            </a:r>
+          </a:p>
+          <a:p>
+            <a:r>
+              <a:rPr lang="sv-SE" dirty="0" smtClean="0"/>
+              <a:t>Födelsedatat, paketerat i ett </a:t>
+            </a:r>
+            <a:r>
+              <a:rPr lang="sv-SE" sz="1600" dirty="0" smtClean="0">
+                <a:latin typeface="Courier New" pitchFamily="49" charset="0"/>
+                <a:cs typeface="Courier New" pitchFamily="49" charset="0"/>
+              </a:rPr>
+              <a:t>Birthday</a:t>
+            </a:r>
+            <a:r>
+              <a:rPr lang="sv-SE" dirty="0" smtClean="0"/>
+              <a:t>-objekt, utgör modellen som skickas till vyn som visar födelsedatat i ett formulär. </a:t>
+            </a:r>
+            <a:r>
+              <a:rPr lang="sv-SE" dirty="0" smtClean="0"/>
+              <a:t>Saknar parametern värde blir det en 400:a. Hittas </a:t>
+            </a:r>
+            <a:r>
+              <a:rPr lang="sv-SE" dirty="0" smtClean="0"/>
+              <a:t>inte någon post med specificerat id </a:t>
+            </a:r>
+            <a:r>
+              <a:rPr lang="sv-SE" dirty="0" smtClean="0"/>
+              <a:t>blir det en 404:a.</a:t>
+            </a:r>
+            <a:endParaRPr lang="sv-SE" dirty="0"/>
+          </a:p>
+        </p:txBody>
+      </p:sp>
       <p:sp>
         <p:nvSpPr>
           <p:cNvPr id="2" name="Rubrik 1"/>
@@ -8282,8 +8060,8 @@
         </p:nvCxnSpPr>
         <p:spPr bwMode="auto">
           <a:xfrm rot="10800000" flipV="1">
-            <a:off x="1736703" y="3247180"/>
-            <a:ext cx="927557" cy="795187"/>
+            <a:off x="1193371" y="3023199"/>
+            <a:ext cx="1168764" cy="1132626"/>
           </a:xfrm>
           <a:prstGeom prst="curvedConnector2">
             <a:avLst/>
@@ -8308,88 +8086,22 @@
           </a:fontRef>
         </p:style>
       </p:cxnSp>
-      <p:pic>
-        <p:nvPicPr>
-          <p:cNvPr id="6149" name="Picture 5"/>
-          <p:cNvPicPr>
-            <a:picLocks noChangeAspect="1" noChangeArrowheads="1"/>
-          </p:cNvPicPr>
-          <p:nvPr/>
-        </p:nvPicPr>
-        <p:blipFill>
-          <a:blip r:embed="rId4">
-            <a:extLst>
-              <a:ext uri="{28A0092B-C50C-407E-A947-70E740481C1C}">
-                <a14:useLocalDpi xmlns:a14="http://schemas.microsoft.com/office/drawing/2010/main" val="0"/>
-              </a:ext>
-            </a:extLst>
-          </a:blip>
-          <a:srcRect/>
-          <a:stretch>
-            <a:fillRect/>
-          </a:stretch>
-        </p:blipFill>
-        <p:spPr bwMode="auto">
-          <a:xfrm rot="420000">
-            <a:off x="4715553" y="1726604"/>
-            <a:ext cx="4666667" cy="4640000"/>
-          </a:xfrm>
-          <a:prstGeom prst="rect">
-            <a:avLst/>
-          </a:prstGeom>
-          <a:solidFill>
-            <a:srgbClr val="FFFFFF">
-              <a:shade val="85000"/>
-            </a:srgbClr>
-          </a:solidFill>
-          <a:ln w="101600" cap="sq">
-            <a:solidFill>
-              <a:srgbClr val="FDFDFD"/>
-            </a:solidFill>
-            <a:miter lim="800000"/>
-          </a:ln>
-          <a:effectLst>
-            <a:outerShdw blurRad="57150" dist="37500" dir="7560000" sy="98000" kx="110000" ky="200000" algn="tl" rotWithShape="0">
-              <a:srgbClr val="000000">
-                <a:alpha val="20000"/>
-              </a:srgbClr>
-            </a:outerShdw>
-          </a:effectLst>
-          <a:scene3d>
-            <a:camera prst="perspectiveRelaxed">
-              <a:rot lat="18960000" lon="0" rev="0"/>
-            </a:camera>
-            <a:lightRig rig="twoPt" dir="t">
-              <a:rot lat="0" lon="0" rev="7200000"/>
-            </a:lightRig>
-          </a:scene3d>
-          <a:sp3d prstMaterial="matte">
-            <a:bevelT w="22860" h="12700"/>
-            <a:contourClr>
-              <a:srgbClr val="FFFFFF"/>
-            </a:contourClr>
-          </a:sp3d>
-          <a:extLst/>
-        </p:spPr>
-      </p:pic>
       <p:cxnSp>
         <p:nvCxnSpPr>
           <p:cNvPr id="24" name="Kurva 23"/>
           <p:cNvCxnSpPr>
             <a:stCxn id="21" idx="7"/>
+            <a:endCxn id="23" idx="2"/>
           </p:cNvCxnSpPr>
           <p:nvPr/>
         </p:nvCxnSpPr>
         <p:spPr bwMode="auto">
-          <a:xfrm rot="16200000" flipH="1">
-            <a:off x="4481142" y="3034108"/>
-            <a:ext cx="48971" cy="860181"/>
+          <a:xfrm rot="5400000" flipH="1" flipV="1">
+            <a:off x="4217368" y="2602953"/>
+            <a:ext cx="142797" cy="2031875"/>
           </a:xfrm>
-          <a:prstGeom prst="curvedConnector4">
-            <a:avLst>
-              <a:gd name="adj1" fmla="val -90674"/>
-              <a:gd name="adj2" fmla="val 43360"/>
-            </a:avLst>
+          <a:prstGeom prst="curvedConnector2">
+            <a:avLst/>
           </a:prstGeom>
           <a:ln>
             <a:headEnd type="none" w="med" len="med"/>
@@ -8411,151 +8123,43 @@
           </a:fontRef>
         </p:style>
       </p:cxnSp>
-      <p:sp>
-        <p:nvSpPr>
-          <p:cNvPr id="28" name="Bildtext höger 27"/>
-          <p:cNvSpPr/>
+      <p:cxnSp>
+        <p:nvCxnSpPr>
+          <p:cNvPr id="27" name="Kurva 26"/>
+          <p:cNvCxnSpPr>
+            <a:stCxn id="25" idx="2"/>
+            <a:endCxn id="26" idx="0"/>
+          </p:cNvCxnSpPr>
           <p:nvPr/>
-        </p:nvSpPr>
+        </p:nvCxnSpPr>
         <p:spPr bwMode="auto">
-          <a:xfrm>
-            <a:off x="762150" y="2770043"/>
-            <a:ext cx="1303473" cy="718641"/>
+          <a:xfrm rot="10800000" flipV="1">
+            <a:off x="1536414" y="3510015"/>
+            <a:ext cx="811486" cy="945969"/>
           </a:xfrm>
-          <a:prstGeom prst="rightArrowCallout">
-            <a:avLst>
-              <a:gd name="adj1" fmla="val 25000"/>
-              <a:gd name="adj2" fmla="val 25000"/>
-              <a:gd name="adj3" fmla="val 25000"/>
-              <a:gd name="adj4" fmla="val 76936"/>
-            </a:avLst>
+          <a:prstGeom prst="curvedConnector2">
+            <a:avLst/>
           </a:prstGeom>
-          <a:solidFill>
-            <a:schemeClr val="tx2">
-              <a:lumMod val="20000"/>
-              <a:lumOff val="80000"/>
-            </a:schemeClr>
-          </a:solidFill>
-          <a:ln w="9525" cap="flat" cmpd="sng" algn="ctr">
-            <a:solidFill>
-              <a:schemeClr val="bg1">
-                <a:lumMod val="75000"/>
-              </a:schemeClr>
-            </a:solidFill>
-            <a:prstDash val="solid"/>
-            <a:round/>
+          <a:ln>
             <a:headEnd type="none" w="med" len="med"/>
-            <a:tailEnd type="none" w="med" len="med"/>
+            <a:tailEnd type="arrow"/>
           </a:ln>
-          <a:effectLst/>
         </p:spPr>
-        <p:txBody>
-          <a:bodyPr vert="horz" wrap="square" lIns="90488" tIns="44450" rIns="90488" bIns="44450" numCol="1" rtlCol="0" anchor="t" anchorCtr="0" compatLnSpc="1">
-            <a:prstTxWarp prst="textNoShape">
-              <a:avLst/>
-            </a:prstTxWarp>
-          </a:bodyPr>
-          <a:lstStyle/>
-          <a:p>
-            <a:pPr marL="0" marR="0" indent="0" algn="l" defTabSz="914400" rtl="0" eaLnBrk="1" fontAlgn="base" latinLnBrk="0" hangingPunct="1">
-              <a:lnSpc>
-                <a:spcPct val="100000"/>
-              </a:lnSpc>
-              <a:spcBef>
-                <a:spcPct val="0"/>
-              </a:spcBef>
-              <a:spcAft>
-                <a:spcPct val="0"/>
-              </a:spcAft>
-              <a:buClrTx/>
-              <a:buSzTx/>
-              <a:buFontTx/>
-              <a:buNone/>
-              <a:tabLst/>
-            </a:pPr>
-            <a:r>
-              <a:rPr kumimoji="0" lang="sv-SE" sz="800" b="0" i="0" u="none" strike="noStrike" cap="none" normalizeH="0" baseline="0" dirty="0" smtClean="0">
-                <a:ln>
-                  <a:noFill/>
-                </a:ln>
-                <a:solidFill>
-                  <a:schemeClr val="bg1">
-                    <a:lumMod val="50000"/>
-                  </a:schemeClr>
-                </a:solidFill>
-                <a:effectLst/>
-                <a:latin typeface="Times New Roman" panose="02020603050405020304" pitchFamily="18" charset="0"/>
-                <a:cs typeface="Times New Roman" panose="02020603050405020304" pitchFamily="18" charset="0"/>
-              </a:rPr>
-              <a:t>Ett alternativ till View(”</a:t>
-            </a:r>
-            <a:r>
-              <a:rPr kumimoji="0" lang="sv-SE" sz="800" b="0" i="0" u="none" strike="noStrike" cap="none" normalizeH="0" baseline="0" dirty="0" err="1" smtClean="0">
-                <a:ln>
-                  <a:noFill/>
-                </a:ln>
-                <a:solidFill>
-                  <a:schemeClr val="bg1">
-                    <a:lumMod val="50000"/>
-                  </a:schemeClr>
-                </a:solidFill>
-                <a:effectLst/>
-                <a:latin typeface="Times New Roman" panose="02020603050405020304" pitchFamily="18" charset="0"/>
-                <a:cs typeface="Times New Roman" panose="02020603050405020304" pitchFamily="18" charset="0"/>
-              </a:rPr>
-              <a:t>NotFound</a:t>
-            </a:r>
-            <a:r>
-              <a:rPr kumimoji="0" lang="sv-SE" sz="800" b="0" i="0" u="none" strike="noStrike" cap="none" normalizeH="0" baseline="0" dirty="0" smtClean="0">
-                <a:ln>
-                  <a:noFill/>
-                </a:ln>
-                <a:solidFill>
-                  <a:schemeClr val="bg1">
-                    <a:lumMod val="50000"/>
-                  </a:schemeClr>
-                </a:solidFill>
-                <a:effectLst/>
-                <a:latin typeface="Times New Roman" panose="02020603050405020304" pitchFamily="18" charset="0"/>
-                <a:cs typeface="Times New Roman" panose="02020603050405020304" pitchFamily="18" charset="0"/>
-              </a:rPr>
-              <a:t>”) är </a:t>
-            </a:r>
-            <a:r>
-              <a:rPr kumimoji="0" lang="sv-SE" sz="800" b="0" i="0" u="none" strike="noStrike" cap="none" normalizeH="0" baseline="0" dirty="0" err="1" smtClean="0">
-                <a:ln>
-                  <a:noFill/>
-                </a:ln>
-                <a:solidFill>
-                  <a:schemeClr val="bg1">
-                    <a:lumMod val="50000"/>
-                  </a:schemeClr>
-                </a:solidFill>
-                <a:effectLst/>
-                <a:latin typeface="Times New Roman" panose="02020603050405020304" pitchFamily="18" charset="0"/>
-                <a:cs typeface="Times New Roman" panose="02020603050405020304" pitchFamily="18" charset="0"/>
-              </a:rPr>
-              <a:t>HttNotFound</a:t>
-            </a:r>
-            <a:r>
-              <a:rPr kumimoji="0" lang="sv-SE" sz="800" b="0" i="0" u="none" strike="noStrike" cap="none" normalizeH="0" baseline="0" dirty="0" smtClean="0">
-                <a:ln>
-                  <a:noFill/>
-                </a:ln>
-                <a:solidFill>
-                  <a:schemeClr val="bg1">
-                    <a:lumMod val="50000"/>
-                  </a:schemeClr>
-                </a:solidFill>
-                <a:effectLst/>
-                <a:latin typeface="Times New Roman" panose="02020603050405020304" pitchFamily="18" charset="0"/>
-                <a:cs typeface="Times New Roman" panose="02020603050405020304" pitchFamily="18" charset="0"/>
-              </a:rPr>
-              <a:t>(), men då måste vi ta hand om en 404…</a:t>
-            </a:r>
-          </a:p>
-        </p:txBody>
-      </p:sp>
+        <p:style>
+          <a:lnRef idx="2">
+            <a:schemeClr val="accent6"/>
+          </a:lnRef>
+          <a:fillRef idx="0">
+            <a:schemeClr val="accent6"/>
+          </a:fillRef>
+          <a:effectRef idx="1">
+            <a:schemeClr val="accent6"/>
+          </a:effectRef>
+          <a:fontRef idx="minor">
+            <a:schemeClr val="tx1"/>
+          </a:fontRef>
+        </p:style>
+      </p:cxnSp>
     </p:spTree>
   </p:cSld>
   <p:clrMapOvr>
@@ -8648,7 +8252,7 @@
       </p:pic>
       <p:pic>
         <p:nvPicPr>
-          <p:cNvPr id="7171" name="Picture 3"/>
+          <p:cNvPr id="2050" name="Picture 2" descr="C:\Users\mats\AppData\Local\Temp\SNAGHTML91cd969.PNG"/>
           <p:cNvPicPr>
             <a:picLocks noChangeAspect="1" noChangeArrowheads="1"/>
           </p:cNvPicPr>
@@ -8676,8 +8280,8 @@
         </p:blipFill>
         <p:spPr bwMode="auto">
           <a:xfrm rot="300000">
-            <a:off x="69516" y="5218822"/>
-            <a:ext cx="8111714" cy="279715"/>
+            <a:off x="5997" y="5127176"/>
+            <a:ext cx="8365962" cy="352075"/>
           </a:xfrm>
           <a:prstGeom prst="rect">
             <a:avLst/>
@@ -8693,19 +8297,9 @@
             <a:ext uri="{909E8E84-426E-40DD-AFC4-6F175D3DCCD1}">
               <a14:hiddenFill xmlns:a14="http://schemas.microsoft.com/office/drawing/2010/main">
                 <a:solidFill>
-                  <a:schemeClr val="accent1"/>
+                  <a:srgbClr val="FFFFFF"/>
                 </a:solidFill>
               </a14:hiddenFill>
-            </a:ext>
-            <a:ext uri="{91240B29-F687-4F45-9708-019B960494DF}">
-              <a14:hiddenLine xmlns:a14="http://schemas.microsoft.com/office/drawing/2010/main" w="9525">
-                <a:solidFill>
-                  <a:schemeClr val="tx1"/>
-                </a:solidFill>
-                <a:miter lim="800000"/>
-                <a:headEnd/>
-                <a:tailEnd/>
-              </a14:hiddenLine>
             </a:ext>
           </a:extLst>
         </p:spPr>
@@ -8752,44 +8346,62 @@
           </a:p>
         </p:txBody>
       </p:sp>
+      <p:sp>
+        <p:nvSpPr>
+          <p:cNvPr id="2" name="Rubrik 1"/>
+          <p:cNvSpPr>
+            <a:spLocks noGrp="1"/>
+          </p:cNvSpPr>
+          <p:nvPr>
+            <p:ph type="title"/>
+          </p:nvPr>
+        </p:nvSpPr>
+        <p:spPr/>
+        <p:txBody>
+          <a:bodyPr/>
+          <a:lstStyle/>
+          <a:p>
+            <a:r>
+              <a:rPr lang="sv-SE" dirty="0" smtClean="0"/>
+              <a:t>Men hur kan ett id skickas till en </a:t>
+            </a:r>
+            <a:r>
+              <a:rPr lang="sv-SE" i="1" dirty="0" smtClean="0"/>
+              <a:t>action method</a:t>
+            </a:r>
+            <a:r>
+              <a:rPr lang="sv-SE" dirty="0" smtClean="0"/>
+              <a:t> ?</a:t>
+            </a:r>
+            <a:endParaRPr lang="sv-SE" dirty="0"/>
+          </a:p>
+        </p:txBody>
+      </p:sp>
       <p:pic>
         <p:nvPicPr>
-          <p:cNvPr id="7170" name="Picture 2"/>
+          <p:cNvPr id="6" name="Bildobjekt 5"/>
           <p:cNvPicPr>
-            <a:picLocks noChangeAspect="1" noChangeArrowheads="1"/>
+            <a:picLocks noChangeAspect="1"/>
           </p:cNvPicPr>
           <p:nvPr/>
         </p:nvPicPr>
         <p:blipFill>
-          <a:blip r:embed="rId4">
-            <a:extLst>
-              <a:ext uri="{28A0092B-C50C-407E-A947-70E740481C1C}">
-                <a14:useLocalDpi xmlns:a14="http://schemas.microsoft.com/office/drawing/2010/main" val="0"/>
-              </a:ext>
-            </a:extLst>
-          </a:blip>
-          <a:srcRect/>
+          <a:blip r:embed="rId4"/>
           <a:stretch>
             <a:fillRect/>
           </a:stretch>
         </p:blipFill>
-        <p:spPr bwMode="auto">
+        <p:spPr>
           <a:xfrm rot="240000">
-            <a:off x="115061" y="1100798"/>
-            <a:ext cx="5791200" cy="3171825"/>
+            <a:off x="456643" y="1089510"/>
+            <a:ext cx="6628474" cy="3365754"/>
           </a:xfrm>
           <a:prstGeom prst="rect">
             <a:avLst/>
           </a:prstGeom>
-          <a:solidFill>
-            <a:srgbClr val="FFFFFF">
-              <a:shade val="85000"/>
-            </a:srgbClr>
-          </a:solidFill>
+          <a:noFill/>
           <a:ln w="101600" cap="sq">
-            <a:solidFill>
-              <a:srgbClr val="FDFDFD"/>
-            </a:solidFill>
+            <a:noFill/>
             <a:miter lim="800000"/>
           </a:ln>
           <a:effectLst>
@@ -8808,45 +8420,13 @@
             </a:lightRig>
           </a:scene3d>
           <a:sp3d prstMaterial="matte">
-            <a:bevelT w="22860" h="12700"/>
+            <a:bevelT w="0" h="0"/>
             <a:contourClr>
               <a:srgbClr val="FFFFFF"/>
             </a:contourClr>
           </a:sp3d>
-          <a:extLst/>
         </p:spPr>
       </p:pic>
-      <p:sp>
-        <p:nvSpPr>
-          <p:cNvPr id="2" name="Rubrik 1"/>
-          <p:cNvSpPr>
-            <a:spLocks noGrp="1"/>
-          </p:cNvSpPr>
-          <p:nvPr>
-            <p:ph type="title"/>
-          </p:nvPr>
-        </p:nvSpPr>
-        <p:spPr/>
-        <p:txBody>
-          <a:bodyPr/>
-          <a:lstStyle/>
-          <a:p>
-            <a:r>
-              <a:rPr lang="sv-SE" dirty="0" smtClean="0"/>
-              <a:t>Men hur kan ett id skickas till en </a:t>
-            </a:r>
-            <a:r>
-              <a:rPr lang="sv-SE" i="1" dirty="0" smtClean="0"/>
-              <a:t>action method</a:t>
-            </a:r>
-            <a:r>
-              <a:rPr lang="sv-SE" dirty="0" smtClean="0"/>
-              <a:t> ?</a:t>
-            </a:r>
-            <a:endParaRPr lang="sv-SE" dirty="0"/>
-          </a:p>
-        </p:txBody>
-      </p:sp>
     </p:spTree>
   </p:cSld>
   <p:clrMapOvr>

</xml_diff>